<commit_message>
Updates to M0-M3 slides.
</commit_message>
<xml_diff>
--- a/M1_Intro_scRNA-Seq/Introduction_scRNA-Seq.pptx
+++ b/M1_Intro_scRNA-Seq/Introduction_scRNA-Seq.pptx
@@ -5,13 +5,23 @@
     <p:sldMasterId id="2147483648" r:id="rId1"/>
   </p:sldMasterIdLst>
   <p:notesMasterIdLst>
-    <p:notesMasterId r:id="rId6"/>
+    <p:notesMasterId r:id="rId16"/>
   </p:notesMasterIdLst>
   <p:sldIdLst>
     <p:sldId id="256" r:id="rId2"/>
-    <p:sldId id="260" r:id="rId3"/>
-    <p:sldId id="261" r:id="rId4"/>
-    <p:sldId id="257" r:id="rId5"/>
+    <p:sldId id="262" r:id="rId3"/>
+    <p:sldId id="263" r:id="rId4"/>
+    <p:sldId id="269" r:id="rId5"/>
+    <p:sldId id="258" r:id="rId6"/>
+    <p:sldId id="260" r:id="rId7"/>
+    <p:sldId id="259" r:id="rId8"/>
+    <p:sldId id="268" r:id="rId9"/>
+    <p:sldId id="264" r:id="rId10"/>
+    <p:sldId id="267" r:id="rId11"/>
+    <p:sldId id="266" r:id="rId12"/>
+    <p:sldId id="265" r:id="rId13"/>
+    <p:sldId id="261" r:id="rId14"/>
+    <p:sldId id="257" r:id="rId15"/>
   </p:sldIdLst>
   <p:sldSz cx="12192000" cy="6858000"/>
   <p:notesSz cx="6858000" cy="9144000"/>
@@ -118,6 +128,18 @@
 </p:presentation>
 </file>
 
+<file path=ppt/commentAuthors.xml><?xml version="1.0" encoding="utf-8"?>
+<p:cmAuthorLst xmlns:a="http://schemas.openxmlformats.org/drawingml/2006/main" xmlns:r="http://schemas.openxmlformats.org/officeDocument/2006/relationships" xmlns:p="http://schemas.openxmlformats.org/presentationml/2006/main">
+  <p:cmAuthor id="1" name="Bruce Allen Corliss" initials="" lastIdx="3" clrIdx="0">
+    <p:extLst>
+      <p:ext uri="{19B8F6BF-5375-455C-9EA6-DF929625EA0E}">
+        <p15:presenceInfo xmlns:p15="http://schemas.microsoft.com/office/powerpoint/2012/main" userId="S::bacorli2@ncsu.edu::ebdc0e58-7ea7-4a1a-a221-8dfdcd56a5df" providerId="AD"/>
+      </p:ext>
+    </p:extLst>
+  </p:cmAuthor>
+</p:cmAuthorLst>
+</file>
+
 <file path=ppt/notesMasters/notesMaster1.xml><?xml version="1.0" encoding="utf-8"?>
 <p:notesMaster xmlns:a="http://schemas.openxmlformats.org/drawingml/2006/main" xmlns:r="http://schemas.openxmlformats.org/officeDocument/2006/relationships" xmlns:p="http://schemas.openxmlformats.org/presentationml/2006/main">
   <p:cSld>
@@ -200,7 +222,7 @@
           <a:p>
             <a:fld id="{FF40CFF0-3E11-4AF6-9747-7919C58FBC48}" type="datetimeFigureOut">
               <a:rPr lang="en-US" smtClean="0"/>
-              <a:t>1/1/2024</a:t>
+              <a:t>1/3/24</a:t>
             </a:fld>
             <a:endParaRPr lang="en-US"/>
           </a:p>
@@ -468,6 +490,396 @@
 </file>
 
 <file path=ppt/notesSlides/notesSlide1.xml><?xml version="1.0" encoding="utf-8"?>
+<p:notes xmlns:a="http://schemas.openxmlformats.org/drawingml/2006/main" xmlns:r="http://schemas.openxmlformats.org/officeDocument/2006/relationships" xmlns:p="http://schemas.openxmlformats.org/presentationml/2006/main" showMasterSp="0" showMasterPhAnim="0">
+  <p:cSld>
+    <p:spTree>
+      <p:nvGrpSpPr>
+        <p:cNvPr id="1" name="Shape 50"/>
+        <p:cNvGrpSpPr/>
+        <p:nvPr/>
+      </p:nvGrpSpPr>
+      <p:grpSpPr>
+        <a:xfrm>
+          <a:off x="0" y="0"/>
+          <a:ext cx="0" cy="0"/>
+          <a:chOff x="0" y="0"/>
+          <a:chExt cx="0" cy="0"/>
+        </a:xfrm>
+      </p:grpSpPr>
+      <p:sp>
+        <p:nvSpPr>
+          <p:cNvPr id="51" name="Google Shape;51;p:notes"/>
+          <p:cNvSpPr>
+            <a:spLocks noGrp="1" noRot="1" noChangeAspect="1"/>
+          </p:cNvSpPr>
+          <p:nvPr>
+            <p:ph type="sldImg" idx="2"/>
+          </p:nvPr>
+        </p:nvSpPr>
+        <p:spPr>
+          <a:xfrm>
+            <a:off x="381000" y="685800"/>
+            <a:ext cx="6096000" cy="3429000"/>
+          </a:xfrm>
+          <a:custGeom>
+            <a:avLst/>
+            <a:gdLst/>
+            <a:ahLst/>
+            <a:cxnLst/>
+            <a:rect l="l" t="t" r="r" b="b"/>
+            <a:pathLst>
+              <a:path w="120000" h="120000" extrusionOk="0">
+                <a:moveTo>
+                  <a:pt x="0" y="0"/>
+                </a:moveTo>
+                <a:lnTo>
+                  <a:pt x="120000" y="0"/>
+                </a:lnTo>
+                <a:lnTo>
+                  <a:pt x="120000" y="120000"/>
+                </a:lnTo>
+                <a:lnTo>
+                  <a:pt x="0" y="120000"/>
+                </a:lnTo>
+                <a:close/>
+              </a:path>
+            </a:pathLst>
+          </a:custGeom>
+        </p:spPr>
+      </p:sp>
+      <p:sp>
+        <p:nvSpPr>
+          <p:cNvPr id="52" name="Google Shape;52;p:notes"/>
+          <p:cNvSpPr txBox="1">
+            <a:spLocks noGrp="1"/>
+          </p:cNvSpPr>
+          <p:nvPr>
+            <p:ph type="body" idx="1"/>
+          </p:nvPr>
+        </p:nvSpPr>
+        <p:spPr>
+          <a:xfrm>
+            <a:off x="685800" y="4343400"/>
+            <a:ext cx="5486400" cy="4114800"/>
+          </a:xfrm>
+          <a:prstGeom prst="rect">
+            <a:avLst/>
+          </a:prstGeom>
+        </p:spPr>
+        <p:txBody>
+          <a:bodyPr spcFirstLastPara="1" wrap="square" lIns="91425" tIns="91425" rIns="91425" bIns="91425" anchor="t" anchorCtr="0">
+            <a:noAutofit/>
+          </a:bodyPr>
+          <a:lstStyle/>
+          <a:p>
+            <a:pPr marL="0" lvl="0" indent="0" algn="l" rtl="0">
+              <a:spcBef>
+                <a:spcPts val="0"/>
+              </a:spcBef>
+              <a:spcAft>
+                <a:spcPts val="0"/>
+              </a:spcAft>
+              <a:buClr>
+                <a:schemeClr val="dk1"/>
+              </a:buClr>
+              <a:buSzPts val="1100"/>
+              <a:buFont typeface="Arial"/>
+              <a:buNone/>
+            </a:pPr>
+            <a:r>
+              <a:rPr lang="en" sz="1400" dirty="0">
+                <a:solidFill>
+                  <a:schemeClr val="dk1"/>
+                </a:solidFill>
+              </a:rPr>
+              <a:t>https://</a:t>
+            </a:r>
+            <a:r>
+              <a:rPr lang="en" sz="1400" dirty="0" err="1">
+                <a:solidFill>
+                  <a:schemeClr val="dk1"/>
+                </a:solidFill>
+              </a:rPr>
+              <a:t>www.ncbi.nlm.nih.gov</a:t>
+            </a:r>
+            <a:r>
+              <a:rPr lang="en" sz="1400" dirty="0">
+                <a:solidFill>
+                  <a:schemeClr val="dk1"/>
+                </a:solidFill>
+              </a:rPr>
+              <a:t>/</a:t>
+            </a:r>
+            <a:r>
+              <a:rPr lang="en" sz="1400" dirty="0" err="1">
+                <a:solidFill>
+                  <a:schemeClr val="dk1"/>
+                </a:solidFill>
+              </a:rPr>
+              <a:t>pmc</a:t>
+            </a:r>
+            <a:r>
+              <a:rPr lang="en" sz="1400" dirty="0">
+                <a:solidFill>
+                  <a:schemeClr val="dk1"/>
+                </a:solidFill>
+              </a:rPr>
+              <a:t>/articles/PMC4758375/</a:t>
+            </a:r>
+            <a:endParaRPr dirty="0"/>
+          </a:p>
+        </p:txBody>
+      </p:sp>
+    </p:spTree>
+  </p:cSld>
+  <p:clrMapOvr>
+    <a:masterClrMapping/>
+  </p:clrMapOvr>
+</p:notes>
+</file>
+
+<file path=ppt/notesSlides/notesSlide10.xml><?xml version="1.0" encoding="utf-8"?>
+<p:notes xmlns:a="http://schemas.openxmlformats.org/drawingml/2006/main" xmlns:r="http://schemas.openxmlformats.org/officeDocument/2006/relationships" xmlns:p="http://schemas.openxmlformats.org/presentationml/2006/main" showMasterSp="0" showMasterPhAnim="0">
+  <p:cSld>
+    <p:spTree>
+      <p:nvGrpSpPr>
+        <p:cNvPr id="1" name="Shape 97"/>
+        <p:cNvGrpSpPr/>
+        <p:nvPr/>
+      </p:nvGrpSpPr>
+      <p:grpSpPr>
+        <a:xfrm>
+          <a:off x="0" y="0"/>
+          <a:ext cx="0" cy="0"/>
+          <a:chOff x="0" y="0"/>
+          <a:chExt cx="0" cy="0"/>
+        </a:xfrm>
+      </p:grpSpPr>
+      <p:sp>
+        <p:nvSpPr>
+          <p:cNvPr id="98" name="Google Shape;98;g2ab70b11b4f_0_70:notes"/>
+          <p:cNvSpPr>
+            <a:spLocks noGrp="1" noRot="1" noChangeAspect="1"/>
+          </p:cNvSpPr>
+          <p:nvPr>
+            <p:ph type="sldImg" idx="2"/>
+          </p:nvPr>
+        </p:nvSpPr>
+        <p:spPr>
+          <a:xfrm>
+            <a:off x="381000" y="685800"/>
+            <a:ext cx="6096000" cy="3429000"/>
+          </a:xfrm>
+          <a:custGeom>
+            <a:avLst/>
+            <a:gdLst/>
+            <a:ahLst/>
+            <a:cxnLst/>
+            <a:rect l="l" t="t" r="r" b="b"/>
+            <a:pathLst>
+              <a:path w="120000" h="120000" extrusionOk="0">
+                <a:moveTo>
+                  <a:pt x="0" y="0"/>
+                </a:moveTo>
+                <a:lnTo>
+                  <a:pt x="120000" y="0"/>
+                </a:lnTo>
+                <a:lnTo>
+                  <a:pt x="120000" y="120000"/>
+                </a:lnTo>
+                <a:lnTo>
+                  <a:pt x="0" y="120000"/>
+                </a:lnTo>
+                <a:close/>
+              </a:path>
+            </a:pathLst>
+          </a:custGeom>
+        </p:spPr>
+      </p:sp>
+      <p:sp>
+        <p:nvSpPr>
+          <p:cNvPr id="99" name="Google Shape;99;g2ab70b11b4f_0_70:notes"/>
+          <p:cNvSpPr txBox="1">
+            <a:spLocks noGrp="1"/>
+          </p:cNvSpPr>
+          <p:nvPr>
+            <p:ph type="body" idx="1"/>
+          </p:nvPr>
+        </p:nvSpPr>
+        <p:spPr>
+          <a:xfrm>
+            <a:off x="685800" y="4343400"/>
+            <a:ext cx="5486400" cy="4114800"/>
+          </a:xfrm>
+          <a:prstGeom prst="rect">
+            <a:avLst/>
+          </a:prstGeom>
+        </p:spPr>
+        <p:txBody>
+          <a:bodyPr spcFirstLastPara="1" wrap="square" lIns="91425" tIns="91425" rIns="91425" bIns="91425" anchor="t" anchorCtr="0">
+            <a:noAutofit/>
+          </a:bodyPr>
+          <a:lstStyle/>
+          <a:p>
+            <a:pPr marL="0" lvl="0" indent="0" algn="l" rtl="0">
+              <a:spcBef>
+                <a:spcPts val="0"/>
+              </a:spcBef>
+              <a:spcAft>
+                <a:spcPts val="0"/>
+              </a:spcAft>
+              <a:buClr>
+                <a:schemeClr val="dk1"/>
+              </a:buClr>
+              <a:buSzPts val="1100"/>
+              <a:buFont typeface="Arial"/>
+              <a:buNone/>
+            </a:pPr>
+            <a:r>
+              <a:rPr lang="en">
+                <a:solidFill>
+                  <a:schemeClr val="dk1"/>
+                </a:solidFill>
+              </a:rPr>
+              <a:t>https://www.ncbi.nlm.nih.gov/pmc/articles/PMC4758375/</a:t>
+            </a:r>
+            <a:endParaRPr>
+              <a:solidFill>
+                <a:schemeClr val="dk1"/>
+              </a:solidFill>
+            </a:endParaRPr>
+          </a:p>
+          <a:p>
+            <a:pPr marL="0" lvl="0" indent="0" algn="l" rtl="0">
+              <a:spcBef>
+                <a:spcPts val="0"/>
+              </a:spcBef>
+              <a:spcAft>
+                <a:spcPts val="0"/>
+              </a:spcAft>
+              <a:buNone/>
+            </a:pPr>
+            <a:endParaRPr/>
+          </a:p>
+        </p:txBody>
+      </p:sp>
+    </p:spTree>
+  </p:cSld>
+  <p:clrMapOvr>
+    <a:masterClrMapping/>
+  </p:clrMapOvr>
+</p:notes>
+</file>
+
+<file path=ppt/notesSlides/notesSlide11.xml><?xml version="1.0" encoding="utf-8"?>
+<p:notes xmlns:a="http://schemas.openxmlformats.org/drawingml/2006/main" xmlns:r="http://schemas.openxmlformats.org/officeDocument/2006/relationships" xmlns:p="http://schemas.openxmlformats.org/presentationml/2006/main" showMasterSp="0" showMasterPhAnim="0">
+  <p:cSld>
+    <p:spTree>
+      <p:nvGrpSpPr>
+        <p:cNvPr id="1" name="Shape 87"/>
+        <p:cNvGrpSpPr/>
+        <p:nvPr/>
+      </p:nvGrpSpPr>
+      <p:grpSpPr>
+        <a:xfrm>
+          <a:off x="0" y="0"/>
+          <a:ext cx="0" cy="0"/>
+          <a:chOff x="0" y="0"/>
+          <a:chExt cx="0" cy="0"/>
+        </a:xfrm>
+      </p:grpSpPr>
+      <p:sp>
+        <p:nvSpPr>
+          <p:cNvPr id="88" name="Google Shape;88;g2ab70b11b4f_0_54:notes"/>
+          <p:cNvSpPr>
+            <a:spLocks noGrp="1" noRot="1" noChangeAspect="1"/>
+          </p:cNvSpPr>
+          <p:nvPr>
+            <p:ph type="sldImg" idx="2"/>
+          </p:nvPr>
+        </p:nvSpPr>
+        <p:spPr>
+          <a:xfrm>
+            <a:off x="381000" y="685800"/>
+            <a:ext cx="6096000" cy="3429000"/>
+          </a:xfrm>
+          <a:custGeom>
+            <a:avLst/>
+            <a:gdLst/>
+            <a:ahLst/>
+            <a:cxnLst/>
+            <a:rect l="l" t="t" r="r" b="b"/>
+            <a:pathLst>
+              <a:path w="120000" h="120000" extrusionOk="0">
+                <a:moveTo>
+                  <a:pt x="0" y="0"/>
+                </a:moveTo>
+                <a:lnTo>
+                  <a:pt x="120000" y="0"/>
+                </a:lnTo>
+                <a:lnTo>
+                  <a:pt x="120000" y="120000"/>
+                </a:lnTo>
+                <a:lnTo>
+                  <a:pt x="0" y="120000"/>
+                </a:lnTo>
+                <a:close/>
+              </a:path>
+            </a:pathLst>
+          </a:custGeom>
+        </p:spPr>
+      </p:sp>
+      <p:sp>
+        <p:nvSpPr>
+          <p:cNvPr id="89" name="Google Shape;89;g2ab70b11b4f_0_54:notes"/>
+          <p:cNvSpPr txBox="1">
+            <a:spLocks noGrp="1"/>
+          </p:cNvSpPr>
+          <p:nvPr>
+            <p:ph type="body" idx="1"/>
+          </p:nvPr>
+        </p:nvSpPr>
+        <p:spPr>
+          <a:xfrm>
+            <a:off x="685800" y="4343400"/>
+            <a:ext cx="5486400" cy="4114800"/>
+          </a:xfrm>
+          <a:prstGeom prst="rect">
+            <a:avLst/>
+          </a:prstGeom>
+        </p:spPr>
+        <p:txBody>
+          <a:bodyPr spcFirstLastPara="1" wrap="square" lIns="91425" tIns="91425" rIns="91425" bIns="91425" anchor="t" anchorCtr="0">
+            <a:noAutofit/>
+          </a:bodyPr>
+          <a:lstStyle/>
+          <a:p>
+            <a:pPr marL="0" lvl="0" indent="0" algn="l" rtl="0">
+              <a:spcBef>
+                <a:spcPts val="0"/>
+              </a:spcBef>
+              <a:spcAft>
+                <a:spcPts val="0"/>
+              </a:spcAft>
+              <a:buNone/>
+            </a:pPr>
+            <a:r>
+              <a:rPr lang="en"/>
+              <a:t>https://www.ncbi.nlm.nih.gov/pmc/articles/PMC4758375/</a:t>
+            </a:r>
+            <a:endParaRPr/>
+          </a:p>
+        </p:txBody>
+      </p:sp>
+    </p:spTree>
+  </p:cSld>
+  <p:clrMapOvr>
+    <a:masterClrMapping/>
+  </p:clrMapOvr>
+</p:notes>
+</file>
+
+<file path=ppt/notesSlides/notesSlide12.xml><?xml version="1.0" encoding="utf-8"?>
 <p:notes xmlns:a="http://schemas.openxmlformats.org/drawingml/2006/main" xmlns:r="http://schemas.openxmlformats.org/officeDocument/2006/relationships" xmlns:p="http://schemas.openxmlformats.org/presentationml/2006/main">
   <p:cSld>
     <p:spTree>
@@ -547,7 +959,7 @@
           <a:p>
             <a:fld id="{121E9C32-9AD5-4F50-8DB4-01491388DC2B}" type="slidenum">
               <a:rPr lang="en-US" smtClean="0"/>
-              <a:t>3</a:t>
+              <a:t>13</a:t>
             </a:fld>
             <a:endParaRPr lang="en-US"/>
           </a:p>
@@ -559,6 +971,981 @@
         <p14:creationId xmlns:p14="http://schemas.microsoft.com/office/powerpoint/2010/main" val="2712886879"/>
       </p:ext>
     </p:extLst>
+  </p:cSld>
+  <p:clrMapOvr>
+    <a:masterClrMapping/>
+  </p:clrMapOvr>
+</p:notes>
+</file>
+
+<file path=ppt/notesSlides/notesSlide2.xml><?xml version="1.0" encoding="utf-8"?>
+<p:notes xmlns:a="http://schemas.openxmlformats.org/drawingml/2006/main" xmlns:r="http://schemas.openxmlformats.org/officeDocument/2006/relationships" xmlns:p="http://schemas.openxmlformats.org/presentationml/2006/main" showMasterSp="0" showMasterPhAnim="0">
+  <p:cSld>
+    <p:spTree>
+      <p:nvGrpSpPr>
+        <p:cNvPr id="1" name="Shape 77"/>
+        <p:cNvGrpSpPr/>
+        <p:nvPr/>
+      </p:nvGrpSpPr>
+      <p:grpSpPr>
+        <a:xfrm>
+          <a:off x="0" y="0"/>
+          <a:ext cx="0" cy="0"/>
+          <a:chOff x="0" y="0"/>
+          <a:chExt cx="0" cy="0"/>
+        </a:xfrm>
+      </p:grpSpPr>
+      <p:sp>
+        <p:nvSpPr>
+          <p:cNvPr id="78" name="Google Shape;78;g2ab70b11b4f_0_35:notes"/>
+          <p:cNvSpPr>
+            <a:spLocks noGrp="1" noRot="1" noChangeAspect="1"/>
+          </p:cNvSpPr>
+          <p:nvPr>
+            <p:ph type="sldImg" idx="2"/>
+          </p:nvPr>
+        </p:nvSpPr>
+        <p:spPr>
+          <a:xfrm>
+            <a:off x="381000" y="685800"/>
+            <a:ext cx="6096000" cy="3429000"/>
+          </a:xfrm>
+          <a:custGeom>
+            <a:avLst/>
+            <a:gdLst/>
+            <a:ahLst/>
+            <a:cxnLst/>
+            <a:rect l="l" t="t" r="r" b="b"/>
+            <a:pathLst>
+              <a:path w="120000" h="120000" extrusionOk="0">
+                <a:moveTo>
+                  <a:pt x="0" y="0"/>
+                </a:moveTo>
+                <a:lnTo>
+                  <a:pt x="120000" y="0"/>
+                </a:lnTo>
+                <a:lnTo>
+                  <a:pt x="120000" y="120000"/>
+                </a:lnTo>
+                <a:lnTo>
+                  <a:pt x="0" y="120000"/>
+                </a:lnTo>
+                <a:close/>
+              </a:path>
+            </a:pathLst>
+          </a:custGeom>
+        </p:spPr>
+      </p:sp>
+      <p:sp>
+        <p:nvSpPr>
+          <p:cNvPr id="79" name="Google Shape;79;g2ab70b11b4f_0_35:notes"/>
+          <p:cNvSpPr txBox="1">
+            <a:spLocks noGrp="1"/>
+          </p:cNvSpPr>
+          <p:nvPr>
+            <p:ph type="body" idx="1"/>
+          </p:nvPr>
+        </p:nvSpPr>
+        <p:spPr>
+          <a:xfrm>
+            <a:off x="685800" y="4343400"/>
+            <a:ext cx="5486400" cy="4114800"/>
+          </a:xfrm>
+          <a:prstGeom prst="rect">
+            <a:avLst/>
+          </a:prstGeom>
+        </p:spPr>
+        <p:txBody>
+          <a:bodyPr spcFirstLastPara="1" wrap="square" lIns="91425" tIns="91425" rIns="91425" bIns="91425" anchor="t" anchorCtr="0">
+            <a:noAutofit/>
+          </a:bodyPr>
+          <a:lstStyle/>
+          <a:p>
+            <a:pPr marL="0" lvl="0" indent="0" algn="l" rtl="0">
+              <a:spcBef>
+                <a:spcPts val="0"/>
+              </a:spcBef>
+              <a:spcAft>
+                <a:spcPts val="0"/>
+              </a:spcAft>
+              <a:buNone/>
+            </a:pPr>
+            <a:r>
+              <a:rPr lang="en" dirty="0"/>
+              <a:t>https://</a:t>
+            </a:r>
+            <a:r>
+              <a:rPr lang="en" dirty="0" err="1"/>
+              <a:t>www.ncbi.nlm.nih.gov</a:t>
+            </a:r>
+            <a:r>
+              <a:rPr lang="en" dirty="0"/>
+              <a:t>/</a:t>
+            </a:r>
+            <a:r>
+              <a:rPr lang="en" dirty="0" err="1"/>
+              <a:t>pmc</a:t>
+            </a:r>
+            <a:r>
+              <a:rPr lang="en" dirty="0"/>
+              <a:t>/articles/PMC8964935/</a:t>
+            </a:r>
+            <a:endParaRPr dirty="0"/>
+          </a:p>
+        </p:txBody>
+      </p:sp>
+    </p:spTree>
+  </p:cSld>
+  <p:clrMapOvr>
+    <a:masterClrMapping/>
+  </p:clrMapOvr>
+</p:notes>
+</file>
+
+<file path=ppt/notesSlides/notesSlide3.xml><?xml version="1.0" encoding="utf-8"?>
+<p:notes xmlns:a="http://schemas.openxmlformats.org/drawingml/2006/main" xmlns:r="http://schemas.openxmlformats.org/officeDocument/2006/relationships" xmlns:p="http://schemas.openxmlformats.org/presentationml/2006/main" showMasterSp="0" showMasterPhAnim="0">
+  <p:cSld>
+    <p:spTree>
+      <p:nvGrpSpPr>
+        <p:cNvPr id="1" name="Shape 62"/>
+        <p:cNvGrpSpPr/>
+        <p:nvPr/>
+      </p:nvGrpSpPr>
+      <p:grpSpPr>
+        <a:xfrm>
+          <a:off x="0" y="0"/>
+          <a:ext cx="0" cy="0"/>
+          <a:chOff x="0" y="0"/>
+          <a:chExt cx="0" cy="0"/>
+        </a:xfrm>
+      </p:grpSpPr>
+      <p:sp>
+        <p:nvSpPr>
+          <p:cNvPr id="63" name="Google Shape;63;g2ab70b11b4f_0_0:notes"/>
+          <p:cNvSpPr>
+            <a:spLocks noGrp="1" noRot="1" noChangeAspect="1"/>
+          </p:cNvSpPr>
+          <p:nvPr>
+            <p:ph type="sldImg" idx="2"/>
+          </p:nvPr>
+        </p:nvSpPr>
+        <p:spPr>
+          <a:xfrm>
+            <a:off x="381000" y="685800"/>
+            <a:ext cx="6096000" cy="3429000"/>
+          </a:xfrm>
+          <a:custGeom>
+            <a:avLst/>
+            <a:gdLst/>
+            <a:ahLst/>
+            <a:cxnLst/>
+            <a:rect l="l" t="t" r="r" b="b"/>
+            <a:pathLst>
+              <a:path w="120000" h="120000" extrusionOk="0">
+                <a:moveTo>
+                  <a:pt x="0" y="0"/>
+                </a:moveTo>
+                <a:lnTo>
+                  <a:pt x="120000" y="0"/>
+                </a:lnTo>
+                <a:lnTo>
+                  <a:pt x="120000" y="120000"/>
+                </a:lnTo>
+                <a:lnTo>
+                  <a:pt x="0" y="120000"/>
+                </a:lnTo>
+                <a:close/>
+              </a:path>
+            </a:pathLst>
+          </a:custGeom>
+        </p:spPr>
+      </p:sp>
+      <p:sp>
+        <p:nvSpPr>
+          <p:cNvPr id="64" name="Google Shape;64;g2ab70b11b4f_0_0:notes"/>
+          <p:cNvSpPr txBox="1">
+            <a:spLocks noGrp="1"/>
+          </p:cNvSpPr>
+          <p:nvPr>
+            <p:ph type="body" idx="1"/>
+          </p:nvPr>
+        </p:nvSpPr>
+        <p:spPr>
+          <a:xfrm>
+            <a:off x="685800" y="4343400"/>
+            <a:ext cx="5486400" cy="4114800"/>
+          </a:xfrm>
+          <a:prstGeom prst="rect">
+            <a:avLst/>
+          </a:prstGeom>
+        </p:spPr>
+        <p:txBody>
+          <a:bodyPr spcFirstLastPara="1" wrap="square" lIns="91425" tIns="91425" rIns="91425" bIns="91425" anchor="t" anchorCtr="0">
+            <a:noAutofit/>
+          </a:bodyPr>
+          <a:lstStyle/>
+          <a:p>
+            <a:pPr marL="0" lvl="0" indent="0" algn="l" rtl="0">
+              <a:spcBef>
+                <a:spcPts val="0"/>
+              </a:spcBef>
+              <a:spcAft>
+                <a:spcPts val="0"/>
+              </a:spcAft>
+              <a:buNone/>
+            </a:pPr>
+            <a:r>
+              <a:rPr lang="en"/>
+              <a:t>https://doi.org/10.1016/j.molcel.2015.04.005</a:t>
+            </a:r>
+            <a:endParaRPr/>
+          </a:p>
+        </p:txBody>
+      </p:sp>
+    </p:spTree>
+    <p:extLst>
+      <p:ext uri="{BB962C8B-B14F-4D97-AF65-F5344CB8AC3E}">
+        <p14:creationId xmlns:p14="http://schemas.microsoft.com/office/powerpoint/2010/main" val="2331317818"/>
+      </p:ext>
+    </p:extLst>
+  </p:cSld>
+  <p:clrMapOvr>
+    <a:masterClrMapping/>
+  </p:clrMapOvr>
+</p:notes>
+</file>
+
+<file path=ppt/notesSlides/notesSlide4.xml><?xml version="1.0" encoding="utf-8"?>
+<p:notes xmlns:a="http://schemas.openxmlformats.org/drawingml/2006/main" xmlns:r="http://schemas.openxmlformats.org/officeDocument/2006/relationships" xmlns:p="http://schemas.openxmlformats.org/presentationml/2006/main" showMasterSp="0" showMasterPhAnim="0">
+  <p:cSld>
+    <p:spTree>
+      <p:nvGrpSpPr>
+        <p:cNvPr id="1" name="Shape 62"/>
+        <p:cNvGrpSpPr/>
+        <p:nvPr/>
+      </p:nvGrpSpPr>
+      <p:grpSpPr>
+        <a:xfrm>
+          <a:off x="0" y="0"/>
+          <a:ext cx="0" cy="0"/>
+          <a:chOff x="0" y="0"/>
+          <a:chExt cx="0" cy="0"/>
+        </a:xfrm>
+      </p:grpSpPr>
+      <p:sp>
+        <p:nvSpPr>
+          <p:cNvPr id="63" name="Google Shape;63;g2ab70b11b4f_0_0:notes"/>
+          <p:cNvSpPr>
+            <a:spLocks noGrp="1" noRot="1" noChangeAspect="1"/>
+          </p:cNvSpPr>
+          <p:nvPr>
+            <p:ph type="sldImg" idx="2"/>
+          </p:nvPr>
+        </p:nvSpPr>
+        <p:spPr>
+          <a:xfrm>
+            <a:off x="381000" y="685800"/>
+            <a:ext cx="6096000" cy="3429000"/>
+          </a:xfrm>
+          <a:custGeom>
+            <a:avLst/>
+            <a:gdLst/>
+            <a:ahLst/>
+            <a:cxnLst/>
+            <a:rect l="l" t="t" r="r" b="b"/>
+            <a:pathLst>
+              <a:path w="120000" h="120000" extrusionOk="0">
+                <a:moveTo>
+                  <a:pt x="0" y="0"/>
+                </a:moveTo>
+                <a:lnTo>
+                  <a:pt x="120000" y="0"/>
+                </a:lnTo>
+                <a:lnTo>
+                  <a:pt x="120000" y="120000"/>
+                </a:lnTo>
+                <a:lnTo>
+                  <a:pt x="0" y="120000"/>
+                </a:lnTo>
+                <a:close/>
+              </a:path>
+            </a:pathLst>
+          </a:custGeom>
+        </p:spPr>
+      </p:sp>
+      <p:sp>
+        <p:nvSpPr>
+          <p:cNvPr id="64" name="Google Shape;64;g2ab70b11b4f_0_0:notes"/>
+          <p:cNvSpPr txBox="1">
+            <a:spLocks noGrp="1"/>
+          </p:cNvSpPr>
+          <p:nvPr>
+            <p:ph type="body" idx="1"/>
+          </p:nvPr>
+        </p:nvSpPr>
+        <p:spPr>
+          <a:xfrm>
+            <a:off x="685800" y="4343400"/>
+            <a:ext cx="5486400" cy="4114800"/>
+          </a:xfrm>
+          <a:prstGeom prst="rect">
+            <a:avLst/>
+          </a:prstGeom>
+        </p:spPr>
+        <p:txBody>
+          <a:bodyPr spcFirstLastPara="1" wrap="square" lIns="91425" tIns="91425" rIns="91425" bIns="91425" anchor="t" anchorCtr="0">
+            <a:noAutofit/>
+          </a:bodyPr>
+          <a:lstStyle/>
+          <a:p>
+            <a:pPr marL="0" lvl="0" indent="0" algn="l" rtl="0">
+              <a:spcBef>
+                <a:spcPts val="0"/>
+              </a:spcBef>
+              <a:spcAft>
+                <a:spcPts val="0"/>
+              </a:spcAft>
+              <a:buNone/>
+            </a:pPr>
+            <a:r>
+              <a:rPr lang="en"/>
+              <a:t>https://doi.org/10.1016/j.molcel.2015.04.005</a:t>
+            </a:r>
+            <a:endParaRPr/>
+          </a:p>
+        </p:txBody>
+      </p:sp>
+    </p:spTree>
+  </p:cSld>
+  <p:clrMapOvr>
+    <a:masterClrMapping/>
+  </p:clrMapOvr>
+</p:notes>
+</file>
+
+<file path=ppt/notesSlides/notesSlide5.xml><?xml version="1.0" encoding="utf-8"?>
+<p:notes xmlns:a="http://schemas.openxmlformats.org/drawingml/2006/main" xmlns:r="http://schemas.openxmlformats.org/officeDocument/2006/relationships" xmlns:p="http://schemas.openxmlformats.org/presentationml/2006/main" showMasterSp="0" showMasterPhAnim="0">
+  <p:cSld>
+    <p:spTree>
+      <p:nvGrpSpPr>
+        <p:cNvPr id="1" name="Shape 72"/>
+        <p:cNvGrpSpPr/>
+        <p:nvPr/>
+      </p:nvGrpSpPr>
+      <p:grpSpPr>
+        <a:xfrm>
+          <a:off x="0" y="0"/>
+          <a:ext cx="0" cy="0"/>
+          <a:chOff x="0" y="0"/>
+          <a:chExt cx="0" cy="0"/>
+        </a:xfrm>
+      </p:grpSpPr>
+      <p:sp>
+        <p:nvSpPr>
+          <p:cNvPr id="73" name="Google Shape;73;g2ab70b11b4f_0_30:notes"/>
+          <p:cNvSpPr>
+            <a:spLocks noGrp="1" noRot="1" noChangeAspect="1"/>
+          </p:cNvSpPr>
+          <p:nvPr>
+            <p:ph type="sldImg" idx="2"/>
+          </p:nvPr>
+        </p:nvSpPr>
+        <p:spPr>
+          <a:xfrm>
+            <a:off x="381000" y="685800"/>
+            <a:ext cx="6096000" cy="3429000"/>
+          </a:xfrm>
+          <a:custGeom>
+            <a:avLst/>
+            <a:gdLst/>
+            <a:ahLst/>
+            <a:cxnLst/>
+            <a:rect l="l" t="t" r="r" b="b"/>
+            <a:pathLst>
+              <a:path w="120000" h="120000" extrusionOk="0">
+                <a:moveTo>
+                  <a:pt x="0" y="0"/>
+                </a:moveTo>
+                <a:lnTo>
+                  <a:pt x="120000" y="0"/>
+                </a:lnTo>
+                <a:lnTo>
+                  <a:pt x="120000" y="120000"/>
+                </a:lnTo>
+                <a:lnTo>
+                  <a:pt x="0" y="120000"/>
+                </a:lnTo>
+                <a:close/>
+              </a:path>
+            </a:pathLst>
+          </a:custGeom>
+        </p:spPr>
+      </p:sp>
+      <p:sp>
+        <p:nvSpPr>
+          <p:cNvPr id="74" name="Google Shape;74;g2ab70b11b4f_0_30:notes"/>
+          <p:cNvSpPr txBox="1">
+            <a:spLocks noGrp="1"/>
+          </p:cNvSpPr>
+          <p:nvPr>
+            <p:ph type="body" idx="1"/>
+          </p:nvPr>
+        </p:nvSpPr>
+        <p:spPr>
+          <a:xfrm>
+            <a:off x="685800" y="4343400"/>
+            <a:ext cx="5486400" cy="4114800"/>
+          </a:xfrm>
+          <a:prstGeom prst="rect">
+            <a:avLst/>
+          </a:prstGeom>
+        </p:spPr>
+        <p:txBody>
+          <a:bodyPr spcFirstLastPara="1" wrap="square" lIns="91425" tIns="91425" rIns="91425" bIns="91425" anchor="t" anchorCtr="0">
+            <a:noAutofit/>
+          </a:bodyPr>
+          <a:lstStyle/>
+          <a:p>
+            <a:pPr marL="0" lvl="0" indent="0" algn="l" rtl="0">
+              <a:spcBef>
+                <a:spcPts val="0"/>
+              </a:spcBef>
+              <a:spcAft>
+                <a:spcPts val="0"/>
+              </a:spcAft>
+              <a:buNone/>
+            </a:pPr>
+            <a:r>
+              <a:rPr lang="en" dirty="0"/>
+              <a:t>https://</a:t>
+            </a:r>
+            <a:r>
+              <a:rPr lang="en" dirty="0" err="1"/>
+              <a:t>www.ncbi.nlm.nih.gov</a:t>
+            </a:r>
+            <a:r>
+              <a:rPr lang="en" dirty="0"/>
+              <a:t>/</a:t>
+            </a:r>
+            <a:r>
+              <a:rPr lang="en" dirty="0" err="1"/>
+              <a:t>pmc</a:t>
+            </a:r>
+            <a:r>
+              <a:rPr lang="en" dirty="0"/>
+              <a:t>/articles/PMC8964935/</a:t>
+            </a:r>
+            <a:endParaRPr dirty="0"/>
+          </a:p>
+        </p:txBody>
+      </p:sp>
+    </p:spTree>
+  </p:cSld>
+  <p:clrMapOvr>
+    <a:masterClrMapping/>
+  </p:clrMapOvr>
+</p:notes>
+</file>
+
+<file path=ppt/notesSlides/notesSlide6.xml><?xml version="1.0" encoding="utf-8"?>
+<p:notes xmlns:a="http://schemas.openxmlformats.org/drawingml/2006/main" xmlns:r="http://schemas.openxmlformats.org/officeDocument/2006/relationships" xmlns:p="http://schemas.openxmlformats.org/presentationml/2006/main" showMasterSp="0" showMasterPhAnim="0">
+  <p:cSld>
+    <p:spTree>
+      <p:nvGrpSpPr>
+        <p:cNvPr id="1" name="Shape 67"/>
+        <p:cNvGrpSpPr/>
+        <p:nvPr/>
+      </p:nvGrpSpPr>
+      <p:grpSpPr>
+        <a:xfrm>
+          <a:off x="0" y="0"/>
+          <a:ext cx="0" cy="0"/>
+          <a:chOff x="0" y="0"/>
+          <a:chExt cx="0" cy="0"/>
+        </a:xfrm>
+      </p:grpSpPr>
+      <p:sp>
+        <p:nvSpPr>
+          <p:cNvPr id="68" name="Google Shape;68;g2ab70b11b4f_0_12:notes"/>
+          <p:cNvSpPr>
+            <a:spLocks noGrp="1" noRot="1" noChangeAspect="1"/>
+          </p:cNvSpPr>
+          <p:nvPr>
+            <p:ph type="sldImg" idx="2"/>
+          </p:nvPr>
+        </p:nvSpPr>
+        <p:spPr>
+          <a:xfrm>
+            <a:off x="381000" y="685800"/>
+            <a:ext cx="6096000" cy="3429000"/>
+          </a:xfrm>
+          <a:custGeom>
+            <a:avLst/>
+            <a:gdLst/>
+            <a:ahLst/>
+            <a:cxnLst/>
+            <a:rect l="l" t="t" r="r" b="b"/>
+            <a:pathLst>
+              <a:path w="120000" h="120000" extrusionOk="0">
+                <a:moveTo>
+                  <a:pt x="0" y="0"/>
+                </a:moveTo>
+                <a:lnTo>
+                  <a:pt x="120000" y="0"/>
+                </a:lnTo>
+                <a:lnTo>
+                  <a:pt x="120000" y="120000"/>
+                </a:lnTo>
+                <a:lnTo>
+                  <a:pt x="0" y="120000"/>
+                </a:lnTo>
+                <a:close/>
+              </a:path>
+            </a:pathLst>
+          </a:custGeom>
+        </p:spPr>
+      </p:sp>
+      <p:sp>
+        <p:nvSpPr>
+          <p:cNvPr id="69" name="Google Shape;69;g2ab70b11b4f_0_12:notes"/>
+          <p:cNvSpPr txBox="1">
+            <a:spLocks noGrp="1"/>
+          </p:cNvSpPr>
+          <p:nvPr>
+            <p:ph type="body" idx="1"/>
+          </p:nvPr>
+        </p:nvSpPr>
+        <p:spPr>
+          <a:xfrm>
+            <a:off x="685800" y="4343400"/>
+            <a:ext cx="5486400" cy="4114800"/>
+          </a:xfrm>
+          <a:prstGeom prst="rect">
+            <a:avLst/>
+          </a:prstGeom>
+        </p:spPr>
+        <p:txBody>
+          <a:bodyPr spcFirstLastPara="1" wrap="square" lIns="91425" tIns="91425" rIns="91425" bIns="91425" anchor="t" anchorCtr="0">
+            <a:noAutofit/>
+          </a:bodyPr>
+          <a:lstStyle/>
+          <a:p>
+            <a:pPr marL="0" lvl="0" indent="0" algn="l" rtl="0">
+              <a:spcBef>
+                <a:spcPts val="0"/>
+              </a:spcBef>
+              <a:spcAft>
+                <a:spcPts val="0"/>
+              </a:spcAft>
+              <a:buNone/>
+            </a:pPr>
+            <a:r>
+              <a:rPr lang="en" dirty="0"/>
+              <a:t>https://</a:t>
+            </a:r>
+            <a:r>
+              <a:rPr lang="en" dirty="0" err="1"/>
+              <a:t>doi.org</a:t>
+            </a:r>
+            <a:r>
+              <a:rPr lang="en" dirty="0"/>
+              <a:t>/10.1016/j.molcel.2015.04.005</a:t>
+            </a:r>
+            <a:endParaRPr dirty="0"/>
+          </a:p>
+        </p:txBody>
+      </p:sp>
+    </p:spTree>
+  </p:cSld>
+  <p:clrMapOvr>
+    <a:masterClrMapping/>
+  </p:clrMapOvr>
+</p:notes>
+</file>
+
+<file path=ppt/notesSlides/notesSlide7.xml><?xml version="1.0" encoding="utf-8"?>
+<p:notes xmlns:a="http://schemas.openxmlformats.org/drawingml/2006/main" xmlns:r="http://schemas.openxmlformats.org/officeDocument/2006/relationships" xmlns:p="http://schemas.openxmlformats.org/presentationml/2006/main" showMasterSp="0" showMasterPhAnim="0">
+  <p:cSld>
+    <p:spTree>
+      <p:nvGrpSpPr>
+        <p:cNvPr id="1" name="Shape 102"/>
+        <p:cNvGrpSpPr/>
+        <p:nvPr/>
+      </p:nvGrpSpPr>
+      <p:grpSpPr>
+        <a:xfrm>
+          <a:off x="0" y="0"/>
+          <a:ext cx="0" cy="0"/>
+          <a:chOff x="0" y="0"/>
+          <a:chExt cx="0" cy="0"/>
+        </a:xfrm>
+      </p:grpSpPr>
+      <p:sp>
+        <p:nvSpPr>
+          <p:cNvPr id="103" name="Google Shape;103;g2ab70b11b4f_0_76:notes"/>
+          <p:cNvSpPr>
+            <a:spLocks noGrp="1" noRot="1" noChangeAspect="1"/>
+          </p:cNvSpPr>
+          <p:nvPr>
+            <p:ph type="sldImg" idx="2"/>
+          </p:nvPr>
+        </p:nvSpPr>
+        <p:spPr>
+          <a:xfrm>
+            <a:off x="381000" y="685800"/>
+            <a:ext cx="6096000" cy="3429000"/>
+          </a:xfrm>
+          <a:custGeom>
+            <a:avLst/>
+            <a:gdLst/>
+            <a:ahLst/>
+            <a:cxnLst/>
+            <a:rect l="l" t="t" r="r" b="b"/>
+            <a:pathLst>
+              <a:path w="120000" h="120000" extrusionOk="0">
+                <a:moveTo>
+                  <a:pt x="0" y="0"/>
+                </a:moveTo>
+                <a:lnTo>
+                  <a:pt x="120000" y="0"/>
+                </a:lnTo>
+                <a:lnTo>
+                  <a:pt x="120000" y="120000"/>
+                </a:lnTo>
+                <a:lnTo>
+                  <a:pt x="0" y="120000"/>
+                </a:lnTo>
+                <a:close/>
+              </a:path>
+            </a:pathLst>
+          </a:custGeom>
+        </p:spPr>
+      </p:sp>
+      <p:sp>
+        <p:nvSpPr>
+          <p:cNvPr id="104" name="Google Shape;104;g2ab70b11b4f_0_76:notes"/>
+          <p:cNvSpPr txBox="1">
+            <a:spLocks noGrp="1"/>
+          </p:cNvSpPr>
+          <p:nvPr>
+            <p:ph type="body" idx="1"/>
+          </p:nvPr>
+        </p:nvSpPr>
+        <p:spPr>
+          <a:xfrm>
+            <a:off x="685800" y="4343400"/>
+            <a:ext cx="5486400" cy="4114800"/>
+          </a:xfrm>
+          <a:prstGeom prst="rect">
+            <a:avLst/>
+          </a:prstGeom>
+        </p:spPr>
+        <p:txBody>
+          <a:bodyPr spcFirstLastPara="1" wrap="square" lIns="91425" tIns="91425" rIns="91425" bIns="91425" anchor="t" anchorCtr="0">
+            <a:noAutofit/>
+          </a:bodyPr>
+          <a:lstStyle/>
+          <a:p>
+            <a:pPr marL="0" lvl="0" indent="0" algn="l" rtl="0">
+              <a:spcBef>
+                <a:spcPts val="0"/>
+              </a:spcBef>
+              <a:spcAft>
+                <a:spcPts val="0"/>
+              </a:spcAft>
+              <a:buClr>
+                <a:schemeClr val="dk1"/>
+              </a:buClr>
+              <a:buSzPts val="1100"/>
+              <a:buFont typeface="Arial"/>
+              <a:buNone/>
+            </a:pPr>
+            <a:r>
+              <a:rPr lang="en">
+                <a:solidFill>
+                  <a:schemeClr val="dk1"/>
+                </a:solidFill>
+              </a:rPr>
+              <a:t>https://www.ncbi.nlm.nih.gov/pmc/articles/PMC4758375/</a:t>
+            </a:r>
+            <a:endParaRPr>
+              <a:solidFill>
+                <a:schemeClr val="dk1"/>
+              </a:solidFill>
+            </a:endParaRPr>
+          </a:p>
+          <a:p>
+            <a:pPr marL="0" lvl="0" indent="0" algn="l" rtl="0">
+              <a:spcBef>
+                <a:spcPts val="0"/>
+              </a:spcBef>
+              <a:spcAft>
+                <a:spcPts val="0"/>
+              </a:spcAft>
+              <a:buNone/>
+            </a:pPr>
+            <a:endParaRPr/>
+          </a:p>
+        </p:txBody>
+      </p:sp>
+    </p:spTree>
+  </p:cSld>
+  <p:clrMapOvr>
+    <a:masterClrMapping/>
+  </p:clrMapOvr>
+</p:notes>
+</file>
+
+<file path=ppt/notesSlides/notesSlide8.xml><?xml version="1.0" encoding="utf-8"?>
+<p:notes xmlns:a="http://schemas.openxmlformats.org/drawingml/2006/main" xmlns:r="http://schemas.openxmlformats.org/officeDocument/2006/relationships" xmlns:p="http://schemas.openxmlformats.org/presentationml/2006/main" showMasterSp="0" showMasterPhAnim="0">
+  <p:cSld>
+    <p:spTree>
+      <p:nvGrpSpPr>
+        <p:cNvPr id="1" name="Shape 82"/>
+        <p:cNvGrpSpPr/>
+        <p:nvPr/>
+      </p:nvGrpSpPr>
+      <p:grpSpPr>
+        <a:xfrm>
+          <a:off x="0" y="0"/>
+          <a:ext cx="0" cy="0"/>
+          <a:chOff x="0" y="0"/>
+          <a:chExt cx="0" cy="0"/>
+        </a:xfrm>
+      </p:grpSpPr>
+      <p:sp>
+        <p:nvSpPr>
+          <p:cNvPr id="83" name="Google Shape;83;g2ab70b11b4f_0_47:notes"/>
+          <p:cNvSpPr>
+            <a:spLocks noGrp="1" noRot="1" noChangeAspect="1"/>
+          </p:cNvSpPr>
+          <p:nvPr>
+            <p:ph type="sldImg" idx="2"/>
+          </p:nvPr>
+        </p:nvSpPr>
+        <p:spPr>
+          <a:xfrm>
+            <a:off x="381000" y="685800"/>
+            <a:ext cx="6096000" cy="3429000"/>
+          </a:xfrm>
+          <a:custGeom>
+            <a:avLst/>
+            <a:gdLst/>
+            <a:ahLst/>
+            <a:cxnLst/>
+            <a:rect l="l" t="t" r="r" b="b"/>
+            <a:pathLst>
+              <a:path w="120000" h="120000" extrusionOk="0">
+                <a:moveTo>
+                  <a:pt x="0" y="0"/>
+                </a:moveTo>
+                <a:lnTo>
+                  <a:pt x="120000" y="0"/>
+                </a:lnTo>
+                <a:lnTo>
+                  <a:pt x="120000" y="120000"/>
+                </a:lnTo>
+                <a:lnTo>
+                  <a:pt x="0" y="120000"/>
+                </a:lnTo>
+                <a:close/>
+              </a:path>
+            </a:pathLst>
+          </a:custGeom>
+        </p:spPr>
+      </p:sp>
+      <p:sp>
+        <p:nvSpPr>
+          <p:cNvPr id="84" name="Google Shape;84;g2ab70b11b4f_0_47:notes"/>
+          <p:cNvSpPr txBox="1">
+            <a:spLocks noGrp="1"/>
+          </p:cNvSpPr>
+          <p:nvPr>
+            <p:ph type="body" idx="1"/>
+          </p:nvPr>
+        </p:nvSpPr>
+        <p:spPr>
+          <a:xfrm>
+            <a:off x="685800" y="4343400"/>
+            <a:ext cx="5486400" cy="4114800"/>
+          </a:xfrm>
+          <a:prstGeom prst="rect">
+            <a:avLst/>
+          </a:prstGeom>
+        </p:spPr>
+        <p:txBody>
+          <a:bodyPr spcFirstLastPara="1" wrap="square" lIns="91425" tIns="91425" rIns="91425" bIns="91425" anchor="t" anchorCtr="0">
+            <a:noAutofit/>
+          </a:bodyPr>
+          <a:lstStyle/>
+          <a:p>
+            <a:pPr marL="0" lvl="0" indent="0" algn="l" rtl="0">
+              <a:spcBef>
+                <a:spcPts val="0"/>
+              </a:spcBef>
+              <a:spcAft>
+                <a:spcPts val="0"/>
+              </a:spcAft>
+              <a:buNone/>
+            </a:pPr>
+            <a:r>
+              <a:rPr lang="en" dirty="0"/>
+              <a:t>https://</a:t>
+            </a:r>
+            <a:r>
+              <a:rPr lang="en" dirty="0" err="1"/>
+              <a:t>www.ncbi.nlm.nih.gov</a:t>
+            </a:r>
+            <a:r>
+              <a:rPr lang="en" dirty="0"/>
+              <a:t>/</a:t>
+            </a:r>
+            <a:r>
+              <a:rPr lang="en" dirty="0" err="1"/>
+              <a:t>pmc</a:t>
+            </a:r>
+            <a:r>
+              <a:rPr lang="en" dirty="0"/>
+              <a:t>/articles/PMC4758375/</a:t>
+            </a:r>
+            <a:endParaRPr dirty="0"/>
+          </a:p>
+        </p:txBody>
+      </p:sp>
+    </p:spTree>
+  </p:cSld>
+  <p:clrMapOvr>
+    <a:masterClrMapping/>
+  </p:clrMapOvr>
+</p:notes>
+</file>
+
+<file path=ppt/notesSlides/notesSlide9.xml><?xml version="1.0" encoding="utf-8"?>
+<p:notes xmlns:a="http://schemas.openxmlformats.org/drawingml/2006/main" xmlns:r="http://schemas.openxmlformats.org/officeDocument/2006/relationships" xmlns:p="http://schemas.openxmlformats.org/presentationml/2006/main" showMasterSp="0" showMasterPhAnim="0">
+  <p:cSld>
+    <p:spTree>
+      <p:nvGrpSpPr>
+        <p:cNvPr id="1" name="Shape 92"/>
+        <p:cNvGrpSpPr/>
+        <p:nvPr/>
+      </p:nvGrpSpPr>
+      <p:grpSpPr>
+        <a:xfrm>
+          <a:off x="0" y="0"/>
+          <a:ext cx="0" cy="0"/>
+          <a:chOff x="0" y="0"/>
+          <a:chExt cx="0" cy="0"/>
+        </a:xfrm>
+      </p:grpSpPr>
+      <p:sp>
+        <p:nvSpPr>
+          <p:cNvPr id="93" name="Google Shape;93;g2ab70b11b4f_0_64:notes"/>
+          <p:cNvSpPr>
+            <a:spLocks noGrp="1" noRot="1" noChangeAspect="1"/>
+          </p:cNvSpPr>
+          <p:nvPr>
+            <p:ph type="sldImg" idx="2"/>
+          </p:nvPr>
+        </p:nvSpPr>
+        <p:spPr>
+          <a:xfrm>
+            <a:off x="381000" y="685800"/>
+            <a:ext cx="6096000" cy="3429000"/>
+          </a:xfrm>
+          <a:custGeom>
+            <a:avLst/>
+            <a:gdLst/>
+            <a:ahLst/>
+            <a:cxnLst/>
+            <a:rect l="l" t="t" r="r" b="b"/>
+            <a:pathLst>
+              <a:path w="120000" h="120000" extrusionOk="0">
+                <a:moveTo>
+                  <a:pt x="0" y="0"/>
+                </a:moveTo>
+                <a:lnTo>
+                  <a:pt x="120000" y="0"/>
+                </a:lnTo>
+                <a:lnTo>
+                  <a:pt x="120000" y="120000"/>
+                </a:lnTo>
+                <a:lnTo>
+                  <a:pt x="0" y="120000"/>
+                </a:lnTo>
+                <a:close/>
+              </a:path>
+            </a:pathLst>
+          </a:custGeom>
+        </p:spPr>
+      </p:sp>
+      <p:sp>
+        <p:nvSpPr>
+          <p:cNvPr id="94" name="Google Shape;94;g2ab70b11b4f_0_64:notes"/>
+          <p:cNvSpPr txBox="1">
+            <a:spLocks noGrp="1"/>
+          </p:cNvSpPr>
+          <p:nvPr>
+            <p:ph type="body" idx="1"/>
+          </p:nvPr>
+        </p:nvSpPr>
+        <p:spPr>
+          <a:xfrm>
+            <a:off x="685800" y="4343400"/>
+            <a:ext cx="5486400" cy="4114800"/>
+          </a:xfrm>
+          <a:prstGeom prst="rect">
+            <a:avLst/>
+          </a:prstGeom>
+        </p:spPr>
+        <p:txBody>
+          <a:bodyPr spcFirstLastPara="1" wrap="square" lIns="91425" tIns="91425" rIns="91425" bIns="91425" anchor="t" anchorCtr="0">
+            <a:noAutofit/>
+          </a:bodyPr>
+          <a:lstStyle/>
+          <a:p>
+            <a:pPr marL="0" lvl="0" indent="0" algn="l" rtl="0">
+              <a:spcBef>
+                <a:spcPts val="0"/>
+              </a:spcBef>
+              <a:spcAft>
+                <a:spcPts val="0"/>
+              </a:spcAft>
+              <a:buClr>
+                <a:schemeClr val="dk1"/>
+              </a:buClr>
+              <a:buSzPts val="1100"/>
+              <a:buFont typeface="Arial"/>
+              <a:buNone/>
+            </a:pPr>
+            <a:r>
+              <a:rPr lang="en">
+                <a:solidFill>
+                  <a:schemeClr val="dk1"/>
+                </a:solidFill>
+              </a:rPr>
+              <a:t>https://www.ncbi.nlm.nih.gov/pmc/articles/PMC4758375/</a:t>
+            </a:r>
+            <a:endParaRPr>
+              <a:solidFill>
+                <a:schemeClr val="dk1"/>
+              </a:solidFill>
+            </a:endParaRPr>
+          </a:p>
+          <a:p>
+            <a:pPr marL="0" lvl="0" indent="0" algn="l" rtl="0">
+              <a:spcBef>
+                <a:spcPts val="0"/>
+              </a:spcBef>
+              <a:spcAft>
+                <a:spcPts val="0"/>
+              </a:spcAft>
+              <a:buNone/>
+            </a:pPr>
+            <a:endParaRPr/>
+          </a:p>
+        </p:txBody>
+      </p:sp>
+    </p:spTree>
   </p:cSld>
   <p:clrMapOvr>
     <a:masterClrMapping/>
@@ -721,7 +2108,7 @@
           <a:p>
             <a:fld id="{9F69634C-F75C-45F7-A87A-C5E2AF3ECA41}" type="datetimeFigureOut">
               <a:rPr lang="en-US" smtClean="0"/>
-              <a:t>1/1/2024</a:t>
+              <a:t>1/3/24</a:t>
             </a:fld>
             <a:endParaRPr lang="en-US"/>
           </a:p>
@@ -885,7 +2272,7 @@
           <a:p>
             <a:fld id="{9F69634C-F75C-45F7-A87A-C5E2AF3ECA41}" type="datetimeFigureOut">
               <a:rPr lang="en-US" smtClean="0"/>
-              <a:t>1/1/2024</a:t>
+              <a:t>1/3/24</a:t>
             </a:fld>
             <a:endParaRPr lang="en-US"/>
           </a:p>
@@ -1088,7 +2475,7 @@
           <a:p>
             <a:fld id="{9F69634C-F75C-45F7-A87A-C5E2AF3ECA41}" type="datetimeFigureOut">
               <a:rPr lang="en-US" smtClean="0"/>
-              <a:t>1/1/2024</a:t>
+              <a:t>1/3/24</a:t>
             </a:fld>
             <a:endParaRPr lang="en-US"/>
           </a:p>
@@ -1353,7 +2740,7 @@
           <a:p>
             <a:fld id="{9F69634C-F75C-45F7-A87A-C5E2AF3ECA41}" type="datetimeFigureOut">
               <a:rPr lang="en-US" smtClean="0"/>
-              <a:t>1/1/2024</a:t>
+              <a:t>1/3/24</a:t>
             </a:fld>
             <a:endParaRPr lang="en-US"/>
           </a:p>
@@ -1466,7 +2853,7 @@
           <a:p>
             <a:fld id="{9F69634C-F75C-45F7-A87A-C5E2AF3ECA41}" type="datetimeFigureOut">
               <a:rPr lang="en-US" smtClean="0"/>
-              <a:t>1/1/2024</a:t>
+              <a:t>1/3/24</a:t>
             </a:fld>
             <a:endParaRPr lang="en-US"/>
           </a:p>
@@ -1530,6 +2917,365 @@
     <p:extLst>
       <p:ext uri="{BB962C8B-B14F-4D97-AF65-F5344CB8AC3E}">
         <p14:creationId xmlns:p14="http://schemas.microsoft.com/office/powerpoint/2010/main" val="1272395690"/>
+      </p:ext>
+    </p:extLst>
+  </p:cSld>
+  <p:clrMapOvr>
+    <a:masterClrMapping/>
+  </p:clrMapOvr>
+</p:sldLayout>
+</file>
+
+<file path=ppt/slideLayouts/slideLayout6.xml><?xml version="1.0" encoding="utf-8"?>
+<p:sldLayout xmlns:a="http://schemas.openxmlformats.org/drawingml/2006/main" xmlns:r="http://schemas.openxmlformats.org/officeDocument/2006/relationships" xmlns:p="http://schemas.openxmlformats.org/presentationml/2006/main" matchingName="Title and body" type="tx">
+  <p:cSld name="Title and body">
+    <p:spTree>
+      <p:nvGrpSpPr>
+        <p:cNvPr id="1" name="Shape 16"/>
+        <p:cNvGrpSpPr/>
+        <p:nvPr/>
+      </p:nvGrpSpPr>
+      <p:grpSpPr>
+        <a:xfrm>
+          <a:off x="0" y="0"/>
+          <a:ext cx="0" cy="0"/>
+          <a:chOff x="0" y="0"/>
+          <a:chExt cx="0" cy="0"/>
+        </a:xfrm>
+      </p:grpSpPr>
+      <p:sp>
+        <p:nvSpPr>
+          <p:cNvPr id="17" name="Google Shape;17;p4"/>
+          <p:cNvSpPr txBox="1">
+            <a:spLocks noGrp="1"/>
+          </p:cNvSpPr>
+          <p:nvPr>
+            <p:ph type="title"/>
+          </p:nvPr>
+        </p:nvSpPr>
+        <p:spPr>
+          <a:xfrm>
+            <a:off x="415600" y="593367"/>
+            <a:ext cx="11360800" cy="763600"/>
+          </a:xfrm>
+          <a:prstGeom prst="rect">
+            <a:avLst/>
+          </a:prstGeom>
+        </p:spPr>
+        <p:txBody>
+          <a:bodyPr spcFirstLastPara="1" wrap="square" lIns="91425" tIns="91425" rIns="91425" bIns="91425" anchor="t" anchorCtr="0">
+            <a:normAutofit/>
+          </a:bodyPr>
+          <a:lstStyle>
+            <a:lvl1pPr lvl="0">
+              <a:spcBef>
+                <a:spcPts val="0"/>
+              </a:spcBef>
+              <a:spcAft>
+                <a:spcPts val="0"/>
+              </a:spcAft>
+              <a:buSzPts val="2800"/>
+              <a:buNone/>
+              <a:defRPr/>
+            </a:lvl1pPr>
+            <a:lvl2pPr lvl="1">
+              <a:spcBef>
+                <a:spcPts val="0"/>
+              </a:spcBef>
+              <a:spcAft>
+                <a:spcPts val="0"/>
+              </a:spcAft>
+              <a:buSzPts val="2800"/>
+              <a:buNone/>
+              <a:defRPr/>
+            </a:lvl2pPr>
+            <a:lvl3pPr lvl="2">
+              <a:spcBef>
+                <a:spcPts val="0"/>
+              </a:spcBef>
+              <a:spcAft>
+                <a:spcPts val="0"/>
+              </a:spcAft>
+              <a:buSzPts val="2800"/>
+              <a:buNone/>
+              <a:defRPr/>
+            </a:lvl3pPr>
+            <a:lvl4pPr lvl="3">
+              <a:spcBef>
+                <a:spcPts val="0"/>
+              </a:spcBef>
+              <a:spcAft>
+                <a:spcPts val="0"/>
+              </a:spcAft>
+              <a:buSzPts val="2800"/>
+              <a:buNone/>
+              <a:defRPr/>
+            </a:lvl4pPr>
+            <a:lvl5pPr lvl="4">
+              <a:spcBef>
+                <a:spcPts val="0"/>
+              </a:spcBef>
+              <a:spcAft>
+                <a:spcPts val="0"/>
+              </a:spcAft>
+              <a:buSzPts val="2800"/>
+              <a:buNone/>
+              <a:defRPr/>
+            </a:lvl5pPr>
+            <a:lvl6pPr lvl="5">
+              <a:spcBef>
+                <a:spcPts val="0"/>
+              </a:spcBef>
+              <a:spcAft>
+                <a:spcPts val="0"/>
+              </a:spcAft>
+              <a:buSzPts val="2800"/>
+              <a:buNone/>
+              <a:defRPr/>
+            </a:lvl6pPr>
+            <a:lvl7pPr lvl="6">
+              <a:spcBef>
+                <a:spcPts val="0"/>
+              </a:spcBef>
+              <a:spcAft>
+                <a:spcPts val="0"/>
+              </a:spcAft>
+              <a:buSzPts val="2800"/>
+              <a:buNone/>
+              <a:defRPr/>
+            </a:lvl7pPr>
+            <a:lvl8pPr lvl="7">
+              <a:spcBef>
+                <a:spcPts val="0"/>
+              </a:spcBef>
+              <a:spcAft>
+                <a:spcPts val="0"/>
+              </a:spcAft>
+              <a:buSzPts val="2800"/>
+              <a:buNone/>
+              <a:defRPr/>
+            </a:lvl8pPr>
+            <a:lvl9pPr lvl="8">
+              <a:spcBef>
+                <a:spcPts val="0"/>
+              </a:spcBef>
+              <a:spcAft>
+                <a:spcPts val="0"/>
+              </a:spcAft>
+              <a:buSzPts val="2800"/>
+              <a:buNone/>
+              <a:defRPr/>
+            </a:lvl9pPr>
+          </a:lstStyle>
+          <a:p>
+            <a:endParaRPr/>
+          </a:p>
+        </p:txBody>
+      </p:sp>
+      <p:sp>
+        <p:nvSpPr>
+          <p:cNvPr id="18" name="Google Shape;18;p4"/>
+          <p:cNvSpPr txBox="1">
+            <a:spLocks noGrp="1"/>
+          </p:cNvSpPr>
+          <p:nvPr>
+            <p:ph type="body" idx="1"/>
+          </p:nvPr>
+        </p:nvSpPr>
+        <p:spPr>
+          <a:xfrm>
+            <a:off x="415600" y="1536633"/>
+            <a:ext cx="11360800" cy="4555200"/>
+          </a:xfrm>
+          <a:prstGeom prst="rect">
+            <a:avLst/>
+          </a:prstGeom>
+        </p:spPr>
+        <p:txBody>
+          <a:bodyPr spcFirstLastPara="1" wrap="square" lIns="91425" tIns="91425" rIns="91425" bIns="91425" anchor="t" anchorCtr="0">
+            <a:normAutofit/>
+          </a:bodyPr>
+          <a:lstStyle>
+            <a:lvl1pPr marL="609585" lvl="0" indent="-457189">
+              <a:spcBef>
+                <a:spcPts val="0"/>
+              </a:spcBef>
+              <a:spcAft>
+                <a:spcPts val="0"/>
+              </a:spcAft>
+              <a:buSzPts val="1800"/>
+              <a:buChar char="●"/>
+              <a:defRPr/>
+            </a:lvl1pPr>
+            <a:lvl2pPr marL="1219170" lvl="1" indent="-423323">
+              <a:spcBef>
+                <a:spcPts val="0"/>
+              </a:spcBef>
+              <a:spcAft>
+                <a:spcPts val="0"/>
+              </a:spcAft>
+              <a:buSzPts val="1400"/>
+              <a:buChar char="○"/>
+              <a:defRPr/>
+            </a:lvl2pPr>
+            <a:lvl3pPr marL="1828754" lvl="2" indent="-423323">
+              <a:spcBef>
+                <a:spcPts val="0"/>
+              </a:spcBef>
+              <a:spcAft>
+                <a:spcPts val="0"/>
+              </a:spcAft>
+              <a:buSzPts val="1400"/>
+              <a:buChar char="■"/>
+              <a:defRPr/>
+            </a:lvl3pPr>
+            <a:lvl4pPr marL="2438339" lvl="3" indent="-423323">
+              <a:spcBef>
+                <a:spcPts val="0"/>
+              </a:spcBef>
+              <a:spcAft>
+                <a:spcPts val="0"/>
+              </a:spcAft>
+              <a:buSzPts val="1400"/>
+              <a:buChar char="●"/>
+              <a:defRPr/>
+            </a:lvl4pPr>
+            <a:lvl5pPr marL="3047924" lvl="4" indent="-423323">
+              <a:spcBef>
+                <a:spcPts val="0"/>
+              </a:spcBef>
+              <a:spcAft>
+                <a:spcPts val="0"/>
+              </a:spcAft>
+              <a:buSzPts val="1400"/>
+              <a:buChar char="○"/>
+              <a:defRPr/>
+            </a:lvl5pPr>
+            <a:lvl6pPr marL="3657509" lvl="5" indent="-423323">
+              <a:spcBef>
+                <a:spcPts val="0"/>
+              </a:spcBef>
+              <a:spcAft>
+                <a:spcPts val="0"/>
+              </a:spcAft>
+              <a:buSzPts val="1400"/>
+              <a:buChar char="■"/>
+              <a:defRPr/>
+            </a:lvl6pPr>
+            <a:lvl7pPr marL="4267093" lvl="6" indent="-423323">
+              <a:spcBef>
+                <a:spcPts val="0"/>
+              </a:spcBef>
+              <a:spcAft>
+                <a:spcPts val="0"/>
+              </a:spcAft>
+              <a:buSzPts val="1400"/>
+              <a:buChar char="●"/>
+              <a:defRPr/>
+            </a:lvl7pPr>
+            <a:lvl8pPr marL="4876678" lvl="7" indent="-423323">
+              <a:spcBef>
+                <a:spcPts val="0"/>
+              </a:spcBef>
+              <a:spcAft>
+                <a:spcPts val="0"/>
+              </a:spcAft>
+              <a:buSzPts val="1400"/>
+              <a:buChar char="○"/>
+              <a:defRPr/>
+            </a:lvl8pPr>
+            <a:lvl9pPr marL="5486263" lvl="8" indent="-423323">
+              <a:spcBef>
+                <a:spcPts val="0"/>
+              </a:spcBef>
+              <a:spcAft>
+                <a:spcPts val="0"/>
+              </a:spcAft>
+              <a:buSzPts val="1400"/>
+              <a:buChar char="■"/>
+              <a:defRPr/>
+            </a:lvl9pPr>
+          </a:lstStyle>
+          <a:p>
+            <a:endParaRPr/>
+          </a:p>
+        </p:txBody>
+      </p:sp>
+      <p:sp>
+        <p:nvSpPr>
+          <p:cNvPr id="19" name="Google Shape;19;p4"/>
+          <p:cNvSpPr txBox="1">
+            <a:spLocks noGrp="1"/>
+          </p:cNvSpPr>
+          <p:nvPr>
+            <p:ph type="sldNum" idx="12"/>
+          </p:nvPr>
+        </p:nvSpPr>
+        <p:spPr>
+          <a:xfrm>
+            <a:off x="11296611" y="6217623"/>
+            <a:ext cx="731600" cy="524800"/>
+          </a:xfrm>
+          <a:prstGeom prst="rect">
+            <a:avLst/>
+          </a:prstGeom>
+        </p:spPr>
+        <p:txBody>
+          <a:bodyPr spcFirstLastPara="1" wrap="square" lIns="91425" tIns="91425" rIns="91425" bIns="91425" anchor="ctr" anchorCtr="0">
+            <a:normAutofit/>
+          </a:bodyPr>
+          <a:lstStyle>
+            <a:lvl1pPr lvl="0">
+              <a:buNone/>
+              <a:defRPr/>
+            </a:lvl1pPr>
+            <a:lvl2pPr lvl="1">
+              <a:buNone/>
+              <a:defRPr/>
+            </a:lvl2pPr>
+            <a:lvl3pPr lvl="2">
+              <a:buNone/>
+              <a:defRPr/>
+            </a:lvl3pPr>
+            <a:lvl4pPr lvl="3">
+              <a:buNone/>
+              <a:defRPr/>
+            </a:lvl4pPr>
+            <a:lvl5pPr lvl="4">
+              <a:buNone/>
+              <a:defRPr/>
+            </a:lvl5pPr>
+            <a:lvl6pPr lvl="5">
+              <a:buNone/>
+              <a:defRPr/>
+            </a:lvl6pPr>
+            <a:lvl7pPr lvl="6">
+              <a:buNone/>
+              <a:defRPr/>
+            </a:lvl7pPr>
+            <a:lvl8pPr lvl="7">
+              <a:buNone/>
+              <a:defRPr/>
+            </a:lvl8pPr>
+            <a:lvl9pPr lvl="8">
+              <a:buNone/>
+              <a:defRPr/>
+            </a:lvl9pPr>
+          </a:lstStyle>
+          <a:p>
+            <a:fld id="{00000000-1234-1234-1234-123412341234}" type="slidenum">
+              <a:rPr lang="en" smtClean="0"/>
+              <a:pPr/>
+              <a:t>‹#›</a:t>
+            </a:fld>
+            <a:endParaRPr lang="en"/>
+          </a:p>
+        </p:txBody>
+      </p:sp>
+    </p:spTree>
+    <p:extLst>
+      <p:ext uri="{BB962C8B-B14F-4D97-AF65-F5344CB8AC3E}">
+        <p14:creationId xmlns:p14="http://schemas.microsoft.com/office/powerpoint/2010/main" val="1030634458"/>
       </p:ext>
     </p:extLst>
   </p:cSld>
@@ -1707,7 +3453,7 @@
           <a:p>
             <a:fld id="{9F69634C-F75C-45F7-A87A-C5E2AF3ECA41}" type="datetimeFigureOut">
               <a:rPr lang="en-US" smtClean="0"/>
-              <a:t>1/1/2024</a:t>
+              <a:t>1/3/24</a:t>
             </a:fld>
             <a:endParaRPr lang="en-US"/>
           </a:p>
@@ -1858,7 +3604,7 @@
               <p:nvPr/>
             </p:nvPicPr>
             <p:blipFill rotWithShape="1">
-              <a:blip r:embed="rId7">
+              <a:blip r:embed="rId8">
                 <a:extLst>
                   <a:ext uri="{28A0092B-C50C-407E-A947-70E740481C1C}">
                     <a14:useLocalDpi xmlns:a14="http://schemas.microsoft.com/office/drawing/2010/main" val="0"/>
@@ -1896,7 +3642,7 @@
               <p:nvPr/>
             </p:nvPicPr>
             <p:blipFill rotWithShape="1">
-              <a:blip r:embed="rId7">
+              <a:blip r:embed="rId8">
                 <a:extLst>
                   <a:ext uri="{28A0092B-C50C-407E-A947-70E740481C1C}">
                     <a14:useLocalDpi xmlns:a14="http://schemas.microsoft.com/office/drawing/2010/main" val="0"/>
@@ -1934,7 +3680,7 @@
               <p:nvPr/>
             </p:nvPicPr>
             <p:blipFill rotWithShape="1">
-              <a:blip r:embed="rId7">
+              <a:blip r:embed="rId8">
                 <a:extLst>
                   <a:ext uri="{28A0092B-C50C-407E-A947-70E740481C1C}">
                     <a14:useLocalDpi xmlns:a14="http://schemas.microsoft.com/office/drawing/2010/main" val="0"/>
@@ -2077,7 +3823,7 @@
             <p:nvPr/>
           </p:nvPicPr>
           <p:blipFill>
-            <a:blip r:embed="rId8">
+            <a:blip r:embed="rId9">
               <a:extLst>
                 <a:ext uri="{28A0092B-C50C-407E-A947-70E740481C1C}">
                   <a14:useLocalDpi xmlns:a14="http://schemas.microsoft.com/office/drawing/2010/main" val="0"/>
@@ -2124,6 +3870,7 @@
     <p:sldLayoutId id="2147483650" r:id="rId3"/>
     <p:sldLayoutId id="2147483652" r:id="rId4"/>
     <p:sldLayoutId id="2147483655" r:id="rId5"/>
+    <p:sldLayoutId id="2147483656" r:id="rId6"/>
   </p:sldLayoutIdLst>
   <p:txStyles>
     <p:titleStyle>
@@ -2508,12 +4255,12 @@
 </p:sld>
 </file>
 
-<file path=ppt/slides/slide2.xml><?xml version="1.0" encoding="utf-8"?>
+<file path=ppt/slides/slide10.xml><?xml version="1.0" encoding="utf-8"?>
 <p:sld xmlns:a="http://schemas.openxmlformats.org/drawingml/2006/main" xmlns:r="http://schemas.openxmlformats.org/officeDocument/2006/relationships" xmlns:p="http://schemas.openxmlformats.org/presentationml/2006/main">
   <p:cSld>
     <p:spTree>
       <p:nvGrpSpPr>
-        <p:cNvPr id="1" name=""/>
+        <p:cNvPr id="1" name="Shape 95"/>
         <p:cNvGrpSpPr/>
         <p:nvPr/>
       </p:nvGrpSpPr>
@@ -2525,12 +4272,40 @@
           <a:chExt cx="0" cy="0"/>
         </a:xfrm>
       </p:grpSpPr>
+      <p:pic>
+        <p:nvPicPr>
+          <p:cNvPr id="96" name="Google Shape;96;p21"/>
+          <p:cNvPicPr preferRelativeResize="0"/>
+          <p:nvPr/>
+        </p:nvPicPr>
+        <p:blipFill>
+          <a:blip r:embed="rId3">
+            <a:alphaModFix/>
+          </a:blip>
+          <a:stretch>
+            <a:fillRect/>
+          </a:stretch>
+        </p:blipFill>
+        <p:spPr>
+          <a:xfrm>
+            <a:off x="203201" y="412700"/>
+            <a:ext cx="11785601" cy="3902203"/>
+          </a:xfrm>
+          <a:prstGeom prst="rect">
+            <a:avLst/>
+          </a:prstGeom>
+          <a:noFill/>
+          <a:ln>
+            <a:noFill/>
+          </a:ln>
+        </p:spPr>
+      </p:pic>
       <p:sp>
         <p:nvSpPr>
           <p:cNvPr id="2" name="Title 1">
             <a:extLst>
               <a:ext uri="{FF2B5EF4-FFF2-40B4-BE49-F238E27FC236}">
-                <a16:creationId xmlns:a16="http://schemas.microsoft.com/office/drawing/2014/main" id="{58765C25-9764-0E33-75E8-12E088084A39}"/>
+                <a16:creationId xmlns:a16="http://schemas.microsoft.com/office/drawing/2014/main" id="{26BD148B-AA67-A81D-BE46-C6B786C22E83}"/>
               </a:ext>
             </a:extLst>
           </p:cNvPr>
@@ -2546,27 +4321,53 @@
           <a:bodyPr/>
           <a:lstStyle/>
           <a:p>
-            <a:r>
-              <a:rPr lang="en-US" dirty="0"/>
-              <a:t>Purpose of Using </a:t>
-            </a:r>
-            <a:r>
-              <a:rPr lang="en-US" dirty="0" err="1"/>
-              <a:t>scRNA</a:t>
-            </a:r>
-            <a:r>
-              <a:rPr lang="en-US" dirty="0"/>
-              <a:t>-Seq</a:t>
-            </a:r>
+            <a:endParaRPr lang="en-US"/>
+          </a:p>
+        </p:txBody>
+      </p:sp>
+      <p:sp>
+        <p:nvSpPr>
+          <p:cNvPr id="3" name="TextBox 2">
+            <a:extLst>
+              <a:ext uri="{FF2B5EF4-FFF2-40B4-BE49-F238E27FC236}">
+                <a16:creationId xmlns:a16="http://schemas.microsoft.com/office/drawing/2014/main" id="{9D0214DE-FBF2-4E0B-76F4-81CA6C1E3F88}"/>
+              </a:ext>
+            </a:extLst>
+          </p:cNvPr>
+          <p:cNvSpPr txBox="1"/>
+          <p:nvPr/>
+        </p:nvSpPr>
+        <p:spPr>
+          <a:xfrm>
+            <a:off x="1" y="6596390"/>
+            <a:ext cx="3230880" cy="261610"/>
+          </a:xfrm>
+          <a:prstGeom prst="rect">
+            <a:avLst/>
+          </a:prstGeom>
+          <a:noFill/>
+        </p:spPr>
+        <p:txBody>
+          <a:bodyPr wrap="square">
+            <a:spAutoFit/>
+          </a:bodyPr>
+          <a:lstStyle/>
+          <a:p>
+            <a:r>
+              <a:rPr lang="en-US" sz="1050" b="0" i="1" dirty="0">
+                <a:solidFill>
+                  <a:srgbClr val="212121"/>
+                </a:solidFill>
+                <a:effectLst/>
+                <a:latin typeface="Helvetica Neue" panose="02000503000000020004" pitchFamily="2" charset="0"/>
+              </a:rPr>
+              <a:t>Liu, 2016; 5: F1000 Faculty Rev-182.c</a:t>
+            </a:r>
+            <a:endParaRPr lang="en-US" sz="1050" i="1" dirty="0"/>
           </a:p>
         </p:txBody>
       </p:sp>
     </p:spTree>
-    <p:extLst>
-      <p:ext uri="{BB962C8B-B14F-4D97-AF65-F5344CB8AC3E}">
-        <p14:creationId xmlns:p14="http://schemas.microsoft.com/office/powerpoint/2010/main" val="1634902693"/>
-      </p:ext>
-    </p:extLst>
   </p:cSld>
   <p:clrMapOvr>
     <a:masterClrMapping/>
@@ -2574,7 +4375,256 @@
 </p:sld>
 </file>
 
-<file path=ppt/slides/slide3.xml><?xml version="1.0" encoding="utf-8"?>
+<file path=ppt/slides/slide11.xml><?xml version="1.0" encoding="utf-8"?>
+<p:sld xmlns:a="http://schemas.openxmlformats.org/drawingml/2006/main" xmlns:r="http://schemas.openxmlformats.org/officeDocument/2006/relationships" xmlns:p="http://schemas.openxmlformats.org/presentationml/2006/main">
+  <p:cSld>
+    <p:spTree>
+      <p:nvGrpSpPr>
+        <p:cNvPr id="1" name="Shape 100"/>
+        <p:cNvGrpSpPr/>
+        <p:nvPr/>
+      </p:nvGrpSpPr>
+      <p:grpSpPr>
+        <a:xfrm>
+          <a:off x="0" y="0"/>
+          <a:ext cx="0" cy="0"/>
+          <a:chOff x="0" y="0"/>
+          <a:chExt cx="0" cy="0"/>
+        </a:xfrm>
+      </p:grpSpPr>
+      <p:pic>
+        <p:nvPicPr>
+          <p:cNvPr id="101" name="Google Shape;101;p22"/>
+          <p:cNvPicPr preferRelativeResize="0"/>
+          <p:nvPr/>
+        </p:nvPicPr>
+        <p:blipFill>
+          <a:blip r:embed="rId3">
+            <a:alphaModFix/>
+          </a:blip>
+          <a:stretch>
+            <a:fillRect/>
+          </a:stretch>
+        </p:blipFill>
+        <p:spPr>
+          <a:xfrm>
+            <a:off x="203201" y="203201"/>
+            <a:ext cx="9225695" cy="6451599"/>
+          </a:xfrm>
+          <a:prstGeom prst="rect">
+            <a:avLst/>
+          </a:prstGeom>
+          <a:noFill/>
+          <a:ln>
+            <a:noFill/>
+          </a:ln>
+        </p:spPr>
+      </p:pic>
+      <p:sp>
+        <p:nvSpPr>
+          <p:cNvPr id="2" name="Title 1">
+            <a:extLst>
+              <a:ext uri="{FF2B5EF4-FFF2-40B4-BE49-F238E27FC236}">
+                <a16:creationId xmlns:a16="http://schemas.microsoft.com/office/drawing/2014/main" id="{3C10D7B1-A284-654F-9FBD-1304BE18C082}"/>
+              </a:ext>
+            </a:extLst>
+          </p:cNvPr>
+          <p:cNvSpPr>
+            <a:spLocks noGrp="1"/>
+          </p:cNvSpPr>
+          <p:nvPr>
+            <p:ph type="title"/>
+          </p:nvPr>
+        </p:nvSpPr>
+        <p:spPr/>
+        <p:txBody>
+          <a:bodyPr/>
+          <a:lstStyle/>
+          <a:p>
+            <a:endParaRPr lang="en-US"/>
+          </a:p>
+        </p:txBody>
+      </p:sp>
+      <p:sp>
+        <p:nvSpPr>
+          <p:cNvPr id="3" name="TextBox 2">
+            <a:extLst>
+              <a:ext uri="{FF2B5EF4-FFF2-40B4-BE49-F238E27FC236}">
+                <a16:creationId xmlns:a16="http://schemas.microsoft.com/office/drawing/2014/main" id="{4AC0D727-DF81-D8C3-01E4-431F6CB1CD76}"/>
+              </a:ext>
+            </a:extLst>
+          </p:cNvPr>
+          <p:cNvSpPr txBox="1"/>
+          <p:nvPr/>
+        </p:nvSpPr>
+        <p:spPr>
+          <a:xfrm>
+            <a:off x="1" y="6596390"/>
+            <a:ext cx="3230880" cy="261610"/>
+          </a:xfrm>
+          <a:prstGeom prst="rect">
+            <a:avLst/>
+          </a:prstGeom>
+          <a:noFill/>
+        </p:spPr>
+        <p:txBody>
+          <a:bodyPr wrap="square">
+            <a:spAutoFit/>
+          </a:bodyPr>
+          <a:lstStyle/>
+          <a:p>
+            <a:r>
+              <a:rPr lang="en-US" sz="1050" b="0" i="1" dirty="0">
+                <a:solidFill>
+                  <a:srgbClr val="212121"/>
+                </a:solidFill>
+                <a:effectLst/>
+                <a:latin typeface="Helvetica Neue" panose="02000503000000020004" pitchFamily="2" charset="0"/>
+              </a:rPr>
+              <a:t>Liu, 2016; 5: F1000 Faculty Rev-182.c</a:t>
+            </a:r>
+            <a:endParaRPr lang="en-US" sz="1050" i="1" dirty="0"/>
+          </a:p>
+        </p:txBody>
+      </p:sp>
+    </p:spTree>
+  </p:cSld>
+  <p:clrMapOvr>
+    <a:masterClrMapping/>
+  </p:clrMapOvr>
+</p:sld>
+</file>
+
+<file path=ppt/slides/slide12.xml><?xml version="1.0" encoding="utf-8"?>
+<p:sld xmlns:a="http://schemas.openxmlformats.org/drawingml/2006/main" xmlns:r="http://schemas.openxmlformats.org/officeDocument/2006/relationships" xmlns:p="http://schemas.openxmlformats.org/presentationml/2006/main">
+  <p:cSld>
+    <p:spTree>
+      <p:nvGrpSpPr>
+        <p:cNvPr id="1" name="Shape 90"/>
+        <p:cNvGrpSpPr/>
+        <p:nvPr/>
+      </p:nvGrpSpPr>
+      <p:grpSpPr>
+        <a:xfrm>
+          <a:off x="0" y="0"/>
+          <a:ext cx="0" cy="0"/>
+          <a:chOff x="0" y="0"/>
+          <a:chExt cx="0" cy="0"/>
+        </a:xfrm>
+      </p:grpSpPr>
+      <p:pic>
+        <p:nvPicPr>
+          <p:cNvPr id="91" name="Google Shape;91;p20"/>
+          <p:cNvPicPr preferRelativeResize="0">
+            <a:picLocks noChangeAspect="1"/>
+          </p:cNvPicPr>
+          <p:nvPr/>
+        </p:nvPicPr>
+        <p:blipFill>
+          <a:blip r:embed="rId3">
+            <a:alphaModFix/>
+          </a:blip>
+          <a:stretch>
+            <a:fillRect/>
+          </a:stretch>
+        </p:blipFill>
+        <p:spPr>
+          <a:xfrm>
+            <a:off x="196197" y="971195"/>
+            <a:ext cx="11799606" cy="5313108"/>
+          </a:xfrm>
+          <a:prstGeom prst="rect">
+            <a:avLst/>
+          </a:prstGeom>
+          <a:noFill/>
+          <a:ln>
+            <a:noFill/>
+          </a:ln>
+        </p:spPr>
+      </p:pic>
+      <p:sp>
+        <p:nvSpPr>
+          <p:cNvPr id="2" name="Title 1">
+            <a:extLst>
+              <a:ext uri="{FF2B5EF4-FFF2-40B4-BE49-F238E27FC236}">
+                <a16:creationId xmlns:a16="http://schemas.microsoft.com/office/drawing/2014/main" id="{7164039E-F0FF-F79C-49F7-13C80200130D}"/>
+              </a:ext>
+            </a:extLst>
+          </p:cNvPr>
+          <p:cNvSpPr>
+            <a:spLocks noGrp="1"/>
+          </p:cNvSpPr>
+          <p:nvPr>
+            <p:ph type="title"/>
+          </p:nvPr>
+        </p:nvSpPr>
+        <p:spPr/>
+        <p:txBody>
+          <a:bodyPr/>
+          <a:lstStyle/>
+          <a:p>
+            <a:r>
+              <a:rPr lang="en-US" dirty="0" err="1"/>
+              <a:t>scRNA</a:t>
+            </a:r>
+            <a:r>
+              <a:rPr lang="en-US" dirty="0"/>
+              <a:t>-Seq Workflow</a:t>
+            </a:r>
+          </a:p>
+        </p:txBody>
+      </p:sp>
+      <p:sp>
+        <p:nvSpPr>
+          <p:cNvPr id="3" name="TextBox 2">
+            <a:extLst>
+              <a:ext uri="{FF2B5EF4-FFF2-40B4-BE49-F238E27FC236}">
+                <a16:creationId xmlns:a16="http://schemas.microsoft.com/office/drawing/2014/main" id="{81D375CF-D9C9-D54C-CB8B-6EDEF708822C}"/>
+              </a:ext>
+            </a:extLst>
+          </p:cNvPr>
+          <p:cNvSpPr txBox="1"/>
+          <p:nvPr/>
+        </p:nvSpPr>
+        <p:spPr>
+          <a:xfrm>
+            <a:off x="1" y="6596390"/>
+            <a:ext cx="3230880" cy="261610"/>
+          </a:xfrm>
+          <a:prstGeom prst="rect">
+            <a:avLst/>
+          </a:prstGeom>
+          <a:noFill/>
+        </p:spPr>
+        <p:txBody>
+          <a:bodyPr wrap="square">
+            <a:spAutoFit/>
+          </a:bodyPr>
+          <a:lstStyle/>
+          <a:p>
+            <a:r>
+              <a:rPr lang="en-US" sz="1050" b="0" i="1" dirty="0">
+                <a:solidFill>
+                  <a:srgbClr val="212121"/>
+                </a:solidFill>
+                <a:effectLst/>
+                <a:latin typeface="Helvetica Neue" panose="02000503000000020004" pitchFamily="2" charset="0"/>
+              </a:rPr>
+              <a:t>Liu, 2016; 5: F1000 Faculty Rev-182.c</a:t>
+            </a:r>
+            <a:endParaRPr lang="en-US" sz="1050" i="1" dirty="0"/>
+          </a:p>
+        </p:txBody>
+      </p:sp>
+    </p:spTree>
+  </p:cSld>
+  <p:clrMapOvr>
+    <a:masterClrMapping/>
+  </p:clrMapOvr>
+</p:sld>
+</file>
+
+<file path=ppt/slides/slide13.xml><?xml version="1.0" encoding="utf-8"?>
 <p:sld xmlns:a="http://schemas.openxmlformats.org/drawingml/2006/main" xmlns:r="http://schemas.openxmlformats.org/officeDocument/2006/relationships" xmlns:p="http://schemas.openxmlformats.org/presentationml/2006/main">
   <p:cSld>
     <p:spTree>
@@ -5979,7 +8029,7 @@
 </p:sld>
 </file>
 
-<file path=ppt/slides/slide4.xml><?xml version="1.0" encoding="utf-8"?>
+<file path=ppt/slides/slide14.xml><?xml version="1.0" encoding="utf-8"?>
 <p:sld xmlns:a="http://schemas.openxmlformats.org/drawingml/2006/main" xmlns:r="http://schemas.openxmlformats.org/officeDocument/2006/relationships" xmlns:p="http://schemas.openxmlformats.org/presentationml/2006/main">
   <p:cSld>
     <p:spTree>
@@ -6035,6 +8085,1197 @@
         <p14:creationId xmlns:p14="http://schemas.microsoft.com/office/powerpoint/2010/main" val="3450757841"/>
       </p:ext>
     </p:extLst>
+  </p:cSld>
+  <p:clrMapOvr>
+    <a:masterClrMapping/>
+  </p:clrMapOvr>
+</p:sld>
+</file>
+
+<file path=ppt/slides/slide2.xml><?xml version="1.0" encoding="utf-8"?>
+<p:sld xmlns:a="http://schemas.openxmlformats.org/drawingml/2006/main" xmlns:r="http://schemas.openxmlformats.org/officeDocument/2006/relationships" xmlns:p="http://schemas.openxmlformats.org/presentationml/2006/main">
+  <p:cSld>
+    <p:spTree>
+      <p:nvGrpSpPr>
+        <p:cNvPr id="1" name="Shape 53"/>
+        <p:cNvGrpSpPr/>
+        <p:nvPr/>
+      </p:nvGrpSpPr>
+      <p:grpSpPr>
+        <a:xfrm>
+          <a:off x="0" y="0"/>
+          <a:ext cx="0" cy="0"/>
+          <a:chOff x="0" y="0"/>
+          <a:chExt cx="0" cy="0"/>
+        </a:xfrm>
+      </p:grpSpPr>
+      <p:sp>
+        <p:nvSpPr>
+          <p:cNvPr id="54" name="Google Shape;54;p13"/>
+          <p:cNvSpPr txBox="1"/>
+          <p:nvPr/>
+        </p:nvSpPr>
+        <p:spPr>
+          <a:xfrm>
+            <a:off x="1784667" y="5062133"/>
+            <a:ext cx="4000000" cy="615513"/>
+          </a:xfrm>
+          <a:prstGeom prst="rect">
+            <a:avLst/>
+          </a:prstGeom>
+          <a:noFill/>
+          <a:ln>
+            <a:noFill/>
+          </a:ln>
+        </p:spPr>
+        <p:txBody>
+          <a:bodyPr spcFirstLastPara="1" wrap="square" lIns="121900" tIns="121900" rIns="121900" bIns="121900" anchor="t" anchorCtr="0">
+            <a:spAutoFit/>
+          </a:bodyPr>
+          <a:lstStyle/>
+          <a:p>
+            <a:endParaRPr sz="2400"/>
+          </a:p>
+        </p:txBody>
+      </p:sp>
+      <p:pic>
+        <p:nvPicPr>
+          <p:cNvPr id="55" name="Google Shape;55;p13"/>
+          <p:cNvPicPr preferRelativeResize="0">
+            <a:picLocks noChangeAspect="1"/>
+          </p:cNvPicPr>
+          <p:nvPr/>
+        </p:nvPicPr>
+        <p:blipFill>
+          <a:blip r:embed="rId3">
+            <a:clrChange>
+              <a:clrFrom>
+                <a:srgbClr val="FFFFFF"/>
+              </a:clrFrom>
+              <a:clrTo>
+                <a:srgbClr val="FFFFFF">
+                  <a:alpha val="0"/>
+                </a:srgbClr>
+              </a:clrTo>
+            </a:clrChange>
+            <a:alphaModFix/>
+          </a:blip>
+          <a:stretch>
+            <a:fillRect/>
+          </a:stretch>
+        </p:blipFill>
+        <p:spPr>
+          <a:xfrm>
+            <a:off x="259189" y="873617"/>
+            <a:ext cx="9844931" cy="6138758"/>
+          </a:xfrm>
+          <a:prstGeom prst="rect">
+            <a:avLst/>
+          </a:prstGeom>
+          <a:noFill/>
+          <a:ln>
+            <a:noFill/>
+          </a:ln>
+        </p:spPr>
+      </p:pic>
+      <p:sp>
+        <p:nvSpPr>
+          <p:cNvPr id="2" name="Title 1">
+            <a:extLst>
+              <a:ext uri="{FF2B5EF4-FFF2-40B4-BE49-F238E27FC236}">
+                <a16:creationId xmlns:a16="http://schemas.microsoft.com/office/drawing/2014/main" id="{6AEE063F-6BD3-5F0D-6A35-5C3AAAE843C5}"/>
+              </a:ext>
+            </a:extLst>
+          </p:cNvPr>
+          <p:cNvSpPr>
+            <a:spLocks noGrp="1"/>
+          </p:cNvSpPr>
+          <p:nvPr>
+            <p:ph type="title"/>
+          </p:nvPr>
+        </p:nvSpPr>
+        <p:spPr/>
+        <p:txBody>
+          <a:bodyPr>
+            <a:normAutofit/>
+          </a:bodyPr>
+          <a:lstStyle/>
+          <a:p>
+            <a:r>
+              <a:rPr lang="en-US" dirty="0"/>
+              <a:t>Applications of Single Cell RNA-Seq</a:t>
+            </a:r>
+          </a:p>
+        </p:txBody>
+      </p:sp>
+      <p:sp>
+        <p:nvSpPr>
+          <p:cNvPr id="4" name="TextBox 3">
+            <a:extLst>
+              <a:ext uri="{FF2B5EF4-FFF2-40B4-BE49-F238E27FC236}">
+                <a16:creationId xmlns:a16="http://schemas.microsoft.com/office/drawing/2014/main" id="{B92BA1F4-C183-3CF7-42D5-4C57770A8418}"/>
+              </a:ext>
+            </a:extLst>
+          </p:cNvPr>
+          <p:cNvSpPr txBox="1"/>
+          <p:nvPr/>
+        </p:nvSpPr>
+        <p:spPr>
+          <a:xfrm>
+            <a:off x="1" y="6596390"/>
+            <a:ext cx="3230880" cy="261610"/>
+          </a:xfrm>
+          <a:prstGeom prst="rect">
+            <a:avLst/>
+          </a:prstGeom>
+          <a:noFill/>
+        </p:spPr>
+        <p:txBody>
+          <a:bodyPr wrap="square">
+            <a:spAutoFit/>
+          </a:bodyPr>
+          <a:lstStyle/>
+          <a:p>
+            <a:r>
+              <a:rPr lang="en-US" sz="1050" b="0" i="1" dirty="0">
+                <a:solidFill>
+                  <a:srgbClr val="212121"/>
+                </a:solidFill>
+                <a:effectLst/>
+                <a:latin typeface="Helvetica Neue" panose="02000503000000020004" pitchFamily="2" charset="0"/>
+              </a:rPr>
+              <a:t>Liu, 2016; 5: F1000 Faculty Rev-182.c</a:t>
+            </a:r>
+            <a:endParaRPr lang="en-US" sz="1050" i="1" dirty="0"/>
+          </a:p>
+        </p:txBody>
+      </p:sp>
+    </p:spTree>
+  </p:cSld>
+  <p:clrMapOvr>
+    <a:masterClrMapping/>
+  </p:clrMapOvr>
+</p:sld>
+</file>
+
+<file path=ppt/slides/slide3.xml><?xml version="1.0" encoding="utf-8"?>
+<p:sld xmlns:a="http://schemas.openxmlformats.org/drawingml/2006/main" xmlns:r="http://schemas.openxmlformats.org/officeDocument/2006/relationships" xmlns:p="http://schemas.openxmlformats.org/presentationml/2006/main">
+  <p:cSld>
+    <p:spTree>
+      <p:nvGrpSpPr>
+        <p:cNvPr id="1" name="Shape 80"/>
+        <p:cNvGrpSpPr/>
+        <p:nvPr/>
+      </p:nvGrpSpPr>
+      <p:grpSpPr>
+        <a:xfrm>
+          <a:off x="0" y="0"/>
+          <a:ext cx="0" cy="0"/>
+          <a:chOff x="0" y="0"/>
+          <a:chExt cx="0" cy="0"/>
+        </a:xfrm>
+      </p:grpSpPr>
+      <p:pic>
+        <p:nvPicPr>
+          <p:cNvPr id="81" name="Google Shape;81;p18"/>
+          <p:cNvPicPr preferRelativeResize="0">
+            <a:picLocks noChangeAspect="1"/>
+          </p:cNvPicPr>
+          <p:nvPr/>
+        </p:nvPicPr>
+        <p:blipFill>
+          <a:blip r:embed="rId3">
+            <a:alphaModFix/>
+          </a:blip>
+          <a:stretch>
+            <a:fillRect/>
+          </a:stretch>
+        </p:blipFill>
+        <p:spPr>
+          <a:xfrm>
+            <a:off x="142214" y="629173"/>
+            <a:ext cx="6236497" cy="6228827"/>
+          </a:xfrm>
+          <a:prstGeom prst="rect">
+            <a:avLst/>
+          </a:prstGeom>
+          <a:noFill/>
+          <a:ln>
+            <a:noFill/>
+          </a:ln>
+        </p:spPr>
+      </p:pic>
+      <p:sp>
+        <p:nvSpPr>
+          <p:cNvPr id="2" name="Title 1">
+            <a:extLst>
+              <a:ext uri="{FF2B5EF4-FFF2-40B4-BE49-F238E27FC236}">
+                <a16:creationId xmlns:a16="http://schemas.microsoft.com/office/drawing/2014/main" id="{E7D9E778-70C5-99DF-8029-70AA6B14F946}"/>
+              </a:ext>
+            </a:extLst>
+          </p:cNvPr>
+          <p:cNvSpPr>
+            <a:spLocks noGrp="1"/>
+          </p:cNvSpPr>
+          <p:nvPr>
+            <p:ph type="title"/>
+          </p:nvPr>
+        </p:nvSpPr>
+        <p:spPr/>
+        <p:txBody>
+          <a:bodyPr/>
+          <a:lstStyle/>
+          <a:p>
+            <a:r>
+              <a:rPr lang="en-US" dirty="0" err="1"/>
+              <a:t>scRNA</a:t>
+            </a:r>
+            <a:r>
+              <a:rPr lang="en-US" dirty="0"/>
+              <a:t>-Seq Research Lifecycle </a:t>
+            </a:r>
+          </a:p>
+        </p:txBody>
+      </p:sp>
+      <p:sp>
+        <p:nvSpPr>
+          <p:cNvPr id="4" name="TextBox 3">
+            <a:extLst>
+              <a:ext uri="{FF2B5EF4-FFF2-40B4-BE49-F238E27FC236}">
+                <a16:creationId xmlns:a16="http://schemas.microsoft.com/office/drawing/2014/main" id="{A40A6364-5745-23AD-A9BF-1A6BC05EC086}"/>
+              </a:ext>
+            </a:extLst>
+          </p:cNvPr>
+          <p:cNvSpPr txBox="1"/>
+          <p:nvPr/>
+        </p:nvSpPr>
+        <p:spPr>
+          <a:xfrm>
+            <a:off x="6955605" y="6596390"/>
+            <a:ext cx="3230880" cy="261610"/>
+          </a:xfrm>
+          <a:prstGeom prst="rect">
+            <a:avLst/>
+          </a:prstGeom>
+          <a:noFill/>
+        </p:spPr>
+        <p:txBody>
+          <a:bodyPr wrap="square">
+            <a:spAutoFit/>
+          </a:bodyPr>
+          <a:lstStyle/>
+          <a:p>
+            <a:r>
+              <a:rPr lang="en-US" sz="1050" b="0" i="1" dirty="0" err="1">
+                <a:solidFill>
+                  <a:srgbClr val="212121"/>
+                </a:solidFill>
+                <a:effectLst/>
+                <a:latin typeface="Helvetica Neue" panose="02000503000000020004" pitchFamily="2" charset="0"/>
+              </a:rPr>
+              <a:t>Jovic</a:t>
+            </a:r>
+            <a:r>
+              <a:rPr lang="en-US" sz="1050" b="0" i="1" dirty="0">
+                <a:solidFill>
+                  <a:srgbClr val="212121"/>
+                </a:solidFill>
+                <a:effectLst/>
+                <a:latin typeface="Helvetica Neue" panose="02000503000000020004" pitchFamily="2" charset="0"/>
+              </a:rPr>
+              <a:t>. Clin </a:t>
+            </a:r>
+            <a:r>
+              <a:rPr lang="en-US" sz="1050" b="0" i="1" dirty="0" err="1">
+                <a:solidFill>
+                  <a:srgbClr val="212121"/>
+                </a:solidFill>
+                <a:effectLst/>
+                <a:latin typeface="Helvetica Neue" panose="02000503000000020004" pitchFamily="2" charset="0"/>
+              </a:rPr>
+              <a:t>Transl</a:t>
+            </a:r>
+            <a:r>
+              <a:rPr lang="en-US" sz="1050" b="0" i="1" dirty="0">
+                <a:solidFill>
+                  <a:srgbClr val="212121"/>
+                </a:solidFill>
+                <a:effectLst/>
+                <a:latin typeface="Helvetica Neue" panose="02000503000000020004" pitchFamily="2" charset="0"/>
+              </a:rPr>
+              <a:t> Med. 2022 Mar; 12(3): e694.</a:t>
+            </a:r>
+            <a:endParaRPr lang="en-US" sz="1050" i="1" dirty="0"/>
+          </a:p>
+        </p:txBody>
+      </p:sp>
+    </p:spTree>
+  </p:cSld>
+  <p:clrMapOvr>
+    <a:masterClrMapping/>
+  </p:clrMapOvr>
+</p:sld>
+</file>
+
+<file path=ppt/slides/slide4.xml><?xml version="1.0" encoding="utf-8"?>
+<p:sld xmlns:a="http://schemas.openxmlformats.org/drawingml/2006/main" xmlns:r="http://schemas.openxmlformats.org/officeDocument/2006/relationships" xmlns:p="http://schemas.openxmlformats.org/presentationml/2006/main">
+  <p:cSld>
+    <p:spTree>
+      <p:nvGrpSpPr>
+        <p:cNvPr id="1" name="Shape 65"/>
+        <p:cNvGrpSpPr/>
+        <p:nvPr/>
+      </p:nvGrpSpPr>
+      <p:grpSpPr>
+        <a:xfrm>
+          <a:off x="0" y="0"/>
+          <a:ext cx="0" cy="0"/>
+          <a:chOff x="0" y="0"/>
+          <a:chExt cx="0" cy="0"/>
+        </a:xfrm>
+      </p:grpSpPr>
+      <p:pic>
+        <p:nvPicPr>
+          <p:cNvPr id="66" name="Google Shape;66;p15"/>
+          <p:cNvPicPr preferRelativeResize="0">
+            <a:picLocks noChangeAspect="1"/>
+          </p:cNvPicPr>
+          <p:nvPr/>
+        </p:nvPicPr>
+        <p:blipFill rotWithShape="1">
+          <a:blip r:embed="rId3">
+            <a:alphaModFix/>
+          </a:blip>
+          <a:srcRect l="33903" t="29427" b="42022"/>
+          <a:stretch/>
+        </p:blipFill>
+        <p:spPr>
+          <a:xfrm>
+            <a:off x="1591294" y="1021278"/>
+            <a:ext cx="8250778" cy="4619501"/>
+          </a:xfrm>
+          <a:prstGeom prst="rect">
+            <a:avLst/>
+          </a:prstGeom>
+          <a:noFill/>
+          <a:ln>
+            <a:noFill/>
+          </a:ln>
+        </p:spPr>
+      </p:pic>
+      <p:sp>
+        <p:nvSpPr>
+          <p:cNvPr id="2" name="Title 1">
+            <a:extLst>
+              <a:ext uri="{FF2B5EF4-FFF2-40B4-BE49-F238E27FC236}">
+                <a16:creationId xmlns:a16="http://schemas.microsoft.com/office/drawing/2014/main" id="{138A7DB4-4752-FBC2-38AC-404B9F6E9C28}"/>
+              </a:ext>
+            </a:extLst>
+          </p:cNvPr>
+          <p:cNvSpPr>
+            <a:spLocks noGrp="1"/>
+          </p:cNvSpPr>
+          <p:nvPr>
+            <p:ph type="title"/>
+          </p:nvPr>
+        </p:nvSpPr>
+        <p:spPr/>
+        <p:txBody>
+          <a:bodyPr/>
+          <a:lstStyle/>
+          <a:p>
+            <a:endParaRPr lang="en-US"/>
+          </a:p>
+        </p:txBody>
+      </p:sp>
+      <p:sp>
+        <p:nvSpPr>
+          <p:cNvPr id="3" name="TextBox 2">
+            <a:extLst>
+              <a:ext uri="{FF2B5EF4-FFF2-40B4-BE49-F238E27FC236}">
+                <a16:creationId xmlns:a16="http://schemas.microsoft.com/office/drawing/2014/main" id="{8B3F4445-AD9E-E1F6-16D5-A45240254318}"/>
+              </a:ext>
+            </a:extLst>
+          </p:cNvPr>
+          <p:cNvSpPr txBox="1"/>
+          <p:nvPr/>
+        </p:nvSpPr>
+        <p:spPr>
+          <a:xfrm>
+            <a:off x="9594192" y="6103231"/>
+            <a:ext cx="3230880" cy="261610"/>
+          </a:xfrm>
+          <a:prstGeom prst="rect">
+            <a:avLst/>
+          </a:prstGeom>
+          <a:noFill/>
+        </p:spPr>
+        <p:txBody>
+          <a:bodyPr wrap="square">
+            <a:spAutoFit/>
+          </a:bodyPr>
+          <a:lstStyle/>
+          <a:p>
+            <a:r>
+              <a:rPr lang="en-US" sz="1050" b="0" i="1" dirty="0">
+                <a:solidFill>
+                  <a:srgbClr val="212121"/>
+                </a:solidFill>
+                <a:effectLst/>
+                <a:latin typeface="Helvetica Neue" panose="02000503000000020004" pitchFamily="2" charset="0"/>
+              </a:rPr>
+              <a:t>Liu, 2016; 5: F1000 Faculty Rev-182.c</a:t>
+            </a:r>
+            <a:endParaRPr lang="en-US" sz="1050" i="1" dirty="0"/>
+          </a:p>
+        </p:txBody>
+      </p:sp>
+    </p:spTree>
+    <p:extLst>
+      <p:ext uri="{BB962C8B-B14F-4D97-AF65-F5344CB8AC3E}">
+        <p14:creationId xmlns:p14="http://schemas.microsoft.com/office/powerpoint/2010/main" val="3637273794"/>
+      </p:ext>
+    </p:extLst>
+  </p:cSld>
+  <p:clrMapOvr>
+    <a:masterClrMapping/>
+  </p:clrMapOvr>
+</p:sld>
+</file>
+
+<file path=ppt/slides/slide5.xml><?xml version="1.0" encoding="utf-8"?>
+<p:sld xmlns:a="http://schemas.openxmlformats.org/drawingml/2006/main" xmlns:r="http://schemas.openxmlformats.org/officeDocument/2006/relationships" xmlns:p="http://schemas.openxmlformats.org/presentationml/2006/main">
+  <p:cSld>
+    <p:spTree>
+      <p:nvGrpSpPr>
+        <p:cNvPr id="1" name="Shape 65"/>
+        <p:cNvGrpSpPr/>
+        <p:nvPr/>
+      </p:nvGrpSpPr>
+      <p:grpSpPr>
+        <a:xfrm>
+          <a:off x="0" y="0"/>
+          <a:ext cx="0" cy="0"/>
+          <a:chOff x="0" y="0"/>
+          <a:chExt cx="0" cy="0"/>
+        </a:xfrm>
+      </p:grpSpPr>
+      <p:pic>
+        <p:nvPicPr>
+          <p:cNvPr id="66" name="Google Shape;66;p15"/>
+          <p:cNvPicPr preferRelativeResize="0"/>
+          <p:nvPr/>
+        </p:nvPicPr>
+        <p:blipFill rotWithShape="1">
+          <a:blip r:embed="rId3">
+            <a:alphaModFix/>
+          </a:blip>
+          <a:srcRect t="26073"/>
+          <a:stretch/>
+        </p:blipFill>
+        <p:spPr>
+          <a:xfrm>
+            <a:off x="982368" y="-823682"/>
+            <a:ext cx="7926033" cy="7595001"/>
+          </a:xfrm>
+          <a:prstGeom prst="rect">
+            <a:avLst/>
+          </a:prstGeom>
+          <a:noFill/>
+          <a:ln>
+            <a:noFill/>
+          </a:ln>
+        </p:spPr>
+      </p:pic>
+      <p:sp>
+        <p:nvSpPr>
+          <p:cNvPr id="2" name="Title 1">
+            <a:extLst>
+              <a:ext uri="{FF2B5EF4-FFF2-40B4-BE49-F238E27FC236}">
+                <a16:creationId xmlns:a16="http://schemas.microsoft.com/office/drawing/2014/main" id="{138A7DB4-4752-FBC2-38AC-404B9F6E9C28}"/>
+              </a:ext>
+            </a:extLst>
+          </p:cNvPr>
+          <p:cNvSpPr>
+            <a:spLocks noGrp="1"/>
+          </p:cNvSpPr>
+          <p:nvPr>
+            <p:ph type="title"/>
+          </p:nvPr>
+        </p:nvSpPr>
+        <p:spPr/>
+        <p:txBody>
+          <a:bodyPr/>
+          <a:lstStyle/>
+          <a:p>
+            <a:endParaRPr lang="en-US"/>
+          </a:p>
+        </p:txBody>
+      </p:sp>
+      <p:sp>
+        <p:nvSpPr>
+          <p:cNvPr id="3" name="TextBox 2">
+            <a:extLst>
+              <a:ext uri="{FF2B5EF4-FFF2-40B4-BE49-F238E27FC236}">
+                <a16:creationId xmlns:a16="http://schemas.microsoft.com/office/drawing/2014/main" id="{8B3F4445-AD9E-E1F6-16D5-A45240254318}"/>
+              </a:ext>
+            </a:extLst>
+          </p:cNvPr>
+          <p:cNvSpPr txBox="1"/>
+          <p:nvPr/>
+        </p:nvSpPr>
+        <p:spPr>
+          <a:xfrm>
+            <a:off x="9594192" y="6103231"/>
+            <a:ext cx="3230880" cy="261610"/>
+          </a:xfrm>
+          <a:prstGeom prst="rect">
+            <a:avLst/>
+          </a:prstGeom>
+          <a:noFill/>
+        </p:spPr>
+        <p:txBody>
+          <a:bodyPr wrap="square">
+            <a:spAutoFit/>
+          </a:bodyPr>
+          <a:lstStyle/>
+          <a:p>
+            <a:r>
+              <a:rPr lang="en-US" sz="1050" b="0" i="1" dirty="0">
+                <a:solidFill>
+                  <a:srgbClr val="212121"/>
+                </a:solidFill>
+                <a:effectLst/>
+                <a:latin typeface="Helvetica Neue" panose="02000503000000020004" pitchFamily="2" charset="0"/>
+              </a:rPr>
+              <a:t>Liu, 2016; 5: F1000 Faculty Rev-182.c</a:t>
+            </a:r>
+            <a:endParaRPr lang="en-US" sz="1050" i="1" dirty="0"/>
+          </a:p>
+        </p:txBody>
+      </p:sp>
+    </p:spTree>
+  </p:cSld>
+  <p:clrMapOvr>
+    <a:masterClrMapping/>
+  </p:clrMapOvr>
+</p:sld>
+</file>
+
+<file path=ppt/slides/slide6.xml><?xml version="1.0" encoding="utf-8"?>
+<p:sld xmlns:a="http://schemas.openxmlformats.org/drawingml/2006/main" xmlns:r="http://schemas.openxmlformats.org/officeDocument/2006/relationships" xmlns:p="http://schemas.openxmlformats.org/presentationml/2006/main">
+  <p:cSld>
+    <p:spTree>
+      <p:nvGrpSpPr>
+        <p:cNvPr id="1" name="Shape 75"/>
+        <p:cNvGrpSpPr/>
+        <p:nvPr/>
+      </p:nvGrpSpPr>
+      <p:grpSpPr>
+        <a:xfrm>
+          <a:off x="0" y="0"/>
+          <a:ext cx="0" cy="0"/>
+          <a:chOff x="0" y="0"/>
+          <a:chExt cx="0" cy="0"/>
+        </a:xfrm>
+      </p:grpSpPr>
+      <p:sp>
+        <p:nvSpPr>
+          <p:cNvPr id="2" name="Title 1">
+            <a:extLst>
+              <a:ext uri="{FF2B5EF4-FFF2-40B4-BE49-F238E27FC236}">
+                <a16:creationId xmlns:a16="http://schemas.microsoft.com/office/drawing/2014/main" id="{B30C1082-F136-B623-AA1F-677478731FBC}"/>
+              </a:ext>
+            </a:extLst>
+          </p:cNvPr>
+          <p:cNvSpPr>
+            <a:spLocks noGrp="1"/>
+          </p:cNvSpPr>
+          <p:nvPr>
+            <p:ph type="title"/>
+          </p:nvPr>
+        </p:nvSpPr>
+        <p:spPr/>
+        <p:txBody>
+          <a:bodyPr/>
+          <a:lstStyle/>
+          <a:p>
+            <a:r>
+              <a:rPr lang="en-US" dirty="0"/>
+              <a:t>Rapid Development of Single Cell RNA Seq</a:t>
+            </a:r>
+          </a:p>
+        </p:txBody>
+      </p:sp>
+      <p:grpSp>
+        <p:nvGrpSpPr>
+          <p:cNvPr id="5" name="Group 4">
+            <a:extLst>
+              <a:ext uri="{FF2B5EF4-FFF2-40B4-BE49-F238E27FC236}">
+                <a16:creationId xmlns:a16="http://schemas.microsoft.com/office/drawing/2014/main" id="{A1990C20-3B60-6F11-79AC-55FC9E4BD2FF}"/>
+              </a:ext>
+            </a:extLst>
+          </p:cNvPr>
+          <p:cNvGrpSpPr>
+            <a:grpSpLocks noChangeAspect="1"/>
+          </p:cNvGrpSpPr>
+          <p:nvPr/>
+        </p:nvGrpSpPr>
+        <p:grpSpPr>
+          <a:xfrm>
+            <a:off x="389762" y="819798"/>
+            <a:ext cx="7020441" cy="5776592"/>
+            <a:chOff x="642480" y="406400"/>
+            <a:chExt cx="7346887" cy="6045200"/>
+          </a:xfrm>
+        </p:grpSpPr>
+        <p:pic>
+          <p:nvPicPr>
+            <p:cNvPr id="76" name="Google Shape;76;p17"/>
+            <p:cNvPicPr preferRelativeResize="0"/>
+            <p:nvPr/>
+          </p:nvPicPr>
+          <p:blipFill rotWithShape="1">
+            <a:blip r:embed="rId3">
+              <a:alphaModFix/>
+            </a:blip>
+            <a:srcRect b="39134"/>
+            <a:stretch/>
+          </p:blipFill>
+          <p:spPr>
+            <a:xfrm>
+              <a:off x="642480" y="406400"/>
+              <a:ext cx="7346887" cy="3926840"/>
+            </a:xfrm>
+            <a:prstGeom prst="rect">
+              <a:avLst/>
+            </a:prstGeom>
+            <a:noFill/>
+            <a:ln>
+              <a:noFill/>
+            </a:ln>
+          </p:spPr>
+        </p:pic>
+        <p:pic>
+          <p:nvPicPr>
+            <p:cNvPr id="3" name="Google Shape;76;p17">
+              <a:extLst>
+                <a:ext uri="{FF2B5EF4-FFF2-40B4-BE49-F238E27FC236}">
+                  <a16:creationId xmlns:a16="http://schemas.microsoft.com/office/drawing/2014/main" id="{424033C9-F2C0-F605-EE00-A354CFE949B4}"/>
+                </a:ext>
+              </a:extLst>
+            </p:cNvPr>
+            <p:cNvPicPr preferRelativeResize="0"/>
+            <p:nvPr/>
+          </p:nvPicPr>
+          <p:blipFill rotWithShape="1">
+            <a:blip r:embed="rId3">
+              <a:alphaModFix/>
+            </a:blip>
+            <a:srcRect t="64803" b="32283"/>
+            <a:stretch/>
+          </p:blipFill>
+          <p:spPr>
+            <a:xfrm>
+              <a:off x="642480" y="4333240"/>
+              <a:ext cx="7346887" cy="187960"/>
+            </a:xfrm>
+            <a:prstGeom prst="rect">
+              <a:avLst/>
+            </a:prstGeom>
+            <a:noFill/>
+            <a:ln>
+              <a:noFill/>
+            </a:ln>
+          </p:spPr>
+        </p:pic>
+        <p:pic>
+          <p:nvPicPr>
+            <p:cNvPr id="4" name="Google Shape;76;p17">
+              <a:extLst>
+                <a:ext uri="{FF2B5EF4-FFF2-40B4-BE49-F238E27FC236}">
+                  <a16:creationId xmlns:a16="http://schemas.microsoft.com/office/drawing/2014/main" id="{BB28250C-041D-0FE2-DA47-10D4D690BE87}"/>
+                </a:ext>
+              </a:extLst>
+            </p:cNvPr>
+            <p:cNvPicPr preferRelativeResize="0"/>
+            <p:nvPr/>
+          </p:nvPicPr>
+          <p:blipFill rotWithShape="1">
+            <a:blip r:embed="rId3">
+              <a:alphaModFix/>
+            </a:blip>
+            <a:srcRect t="70079"/>
+            <a:stretch/>
+          </p:blipFill>
+          <p:spPr>
+            <a:xfrm>
+              <a:off x="642480" y="4521200"/>
+              <a:ext cx="7346887" cy="1930400"/>
+            </a:xfrm>
+            <a:prstGeom prst="rect">
+              <a:avLst/>
+            </a:prstGeom>
+            <a:noFill/>
+            <a:ln>
+              <a:noFill/>
+            </a:ln>
+          </p:spPr>
+        </p:pic>
+      </p:grpSp>
+      <p:sp>
+        <p:nvSpPr>
+          <p:cNvPr id="7" name="TextBox 6">
+            <a:extLst>
+              <a:ext uri="{FF2B5EF4-FFF2-40B4-BE49-F238E27FC236}">
+                <a16:creationId xmlns:a16="http://schemas.microsoft.com/office/drawing/2014/main" id="{D273CAA3-4208-BFA8-7EDD-1CCFD2B8D54C}"/>
+              </a:ext>
+            </a:extLst>
+          </p:cNvPr>
+          <p:cNvSpPr txBox="1"/>
+          <p:nvPr/>
+        </p:nvSpPr>
+        <p:spPr>
+          <a:xfrm>
+            <a:off x="6955605" y="6596390"/>
+            <a:ext cx="3230880" cy="261610"/>
+          </a:xfrm>
+          <a:prstGeom prst="rect">
+            <a:avLst/>
+          </a:prstGeom>
+          <a:noFill/>
+        </p:spPr>
+        <p:txBody>
+          <a:bodyPr wrap="square">
+            <a:spAutoFit/>
+          </a:bodyPr>
+          <a:lstStyle/>
+          <a:p>
+            <a:r>
+              <a:rPr lang="en-US" sz="1050" b="0" i="1" dirty="0" err="1">
+                <a:solidFill>
+                  <a:srgbClr val="212121"/>
+                </a:solidFill>
+                <a:effectLst/>
+                <a:latin typeface="Helvetica Neue" panose="02000503000000020004" pitchFamily="2" charset="0"/>
+              </a:rPr>
+              <a:t>Jovic</a:t>
+            </a:r>
+            <a:r>
+              <a:rPr lang="en-US" sz="1050" b="0" i="1" dirty="0">
+                <a:solidFill>
+                  <a:srgbClr val="212121"/>
+                </a:solidFill>
+                <a:effectLst/>
+                <a:latin typeface="Helvetica Neue" panose="02000503000000020004" pitchFamily="2" charset="0"/>
+              </a:rPr>
+              <a:t>. Clin </a:t>
+            </a:r>
+            <a:r>
+              <a:rPr lang="en-US" sz="1050" b="0" i="1" dirty="0" err="1">
+                <a:solidFill>
+                  <a:srgbClr val="212121"/>
+                </a:solidFill>
+                <a:effectLst/>
+                <a:latin typeface="Helvetica Neue" panose="02000503000000020004" pitchFamily="2" charset="0"/>
+              </a:rPr>
+              <a:t>Transl</a:t>
+            </a:r>
+            <a:r>
+              <a:rPr lang="en-US" sz="1050" b="0" i="1" dirty="0">
+                <a:solidFill>
+                  <a:srgbClr val="212121"/>
+                </a:solidFill>
+                <a:effectLst/>
+                <a:latin typeface="Helvetica Neue" panose="02000503000000020004" pitchFamily="2" charset="0"/>
+              </a:rPr>
+              <a:t> Med. 2022 Mar; 12(3): e694.</a:t>
+            </a:r>
+            <a:endParaRPr lang="en-US" sz="1050" i="1" dirty="0"/>
+          </a:p>
+        </p:txBody>
+      </p:sp>
+      <p:sp>
+        <p:nvSpPr>
+          <p:cNvPr id="8" name="TextBox 7">
+            <a:extLst>
+              <a:ext uri="{FF2B5EF4-FFF2-40B4-BE49-F238E27FC236}">
+                <a16:creationId xmlns:a16="http://schemas.microsoft.com/office/drawing/2014/main" id="{F70CFCF3-D059-C60E-BD73-FA5EDB8BC3A8}"/>
+              </a:ext>
+            </a:extLst>
+          </p:cNvPr>
+          <p:cNvSpPr txBox="1"/>
+          <p:nvPr/>
+        </p:nvSpPr>
+        <p:spPr>
+          <a:xfrm>
+            <a:off x="7683335" y="1436915"/>
+            <a:ext cx="3564053" cy="369332"/>
+          </a:xfrm>
+          <a:prstGeom prst="rect">
+            <a:avLst/>
+          </a:prstGeom>
+          <a:noFill/>
+        </p:spPr>
+        <p:txBody>
+          <a:bodyPr wrap="none" rtlCol="0">
+            <a:spAutoFit/>
+          </a:bodyPr>
+          <a:lstStyle/>
+          <a:p>
+            <a:r>
+              <a:rPr lang="en-US" dirty="0"/>
+              <a:t>Rapid rise of </a:t>
+            </a:r>
+            <a:r>
+              <a:rPr lang="en-US" dirty="0" err="1"/>
+              <a:t>scRNA</a:t>
+            </a:r>
+            <a:r>
+              <a:rPr lang="en-US" dirty="0"/>
+              <a:t>-Seq’s popularity</a:t>
+            </a:r>
+          </a:p>
+        </p:txBody>
+      </p:sp>
+    </p:spTree>
+  </p:cSld>
+  <p:clrMapOvr>
+    <a:masterClrMapping/>
+  </p:clrMapOvr>
+</p:sld>
+</file>
+
+<file path=ppt/slides/slide7.xml><?xml version="1.0" encoding="utf-8"?>
+<p:sld xmlns:a="http://schemas.openxmlformats.org/drawingml/2006/main" xmlns:r="http://schemas.openxmlformats.org/officeDocument/2006/relationships" xmlns:p="http://schemas.openxmlformats.org/presentationml/2006/main">
+  <p:cSld>
+    <p:spTree>
+      <p:nvGrpSpPr>
+        <p:cNvPr id="1" name="Shape 70"/>
+        <p:cNvGrpSpPr/>
+        <p:nvPr/>
+      </p:nvGrpSpPr>
+      <p:grpSpPr>
+        <a:xfrm>
+          <a:off x="0" y="0"/>
+          <a:ext cx="0" cy="0"/>
+          <a:chOff x="0" y="0"/>
+          <a:chExt cx="0" cy="0"/>
+        </a:xfrm>
+      </p:grpSpPr>
+      <p:pic>
+        <p:nvPicPr>
+          <p:cNvPr id="71" name="Google Shape;71;p16"/>
+          <p:cNvPicPr preferRelativeResize="0"/>
+          <p:nvPr/>
+        </p:nvPicPr>
+        <p:blipFill rotWithShape="1">
+          <a:blip r:embed="rId3">
+            <a:alphaModFix/>
+          </a:blip>
+          <a:srcRect l="5986" b="74347"/>
+          <a:stretch/>
+        </p:blipFill>
+        <p:spPr>
+          <a:xfrm>
+            <a:off x="153977" y="1402671"/>
+            <a:ext cx="9408614" cy="3469400"/>
+          </a:xfrm>
+          <a:prstGeom prst="rect">
+            <a:avLst/>
+          </a:prstGeom>
+          <a:noFill/>
+          <a:ln>
+            <a:noFill/>
+          </a:ln>
+        </p:spPr>
+      </p:pic>
+      <p:sp>
+        <p:nvSpPr>
+          <p:cNvPr id="2" name="Title 1">
+            <a:extLst>
+              <a:ext uri="{FF2B5EF4-FFF2-40B4-BE49-F238E27FC236}">
+                <a16:creationId xmlns:a16="http://schemas.microsoft.com/office/drawing/2014/main" id="{8C545D9B-2F9D-1903-E0C2-5893C6BE2A25}"/>
+              </a:ext>
+            </a:extLst>
+          </p:cNvPr>
+          <p:cNvSpPr>
+            <a:spLocks noGrp="1"/>
+          </p:cNvSpPr>
+          <p:nvPr>
+            <p:ph type="title"/>
+          </p:nvPr>
+        </p:nvSpPr>
+        <p:spPr/>
+        <p:txBody>
+          <a:bodyPr/>
+          <a:lstStyle/>
+          <a:p>
+            <a:r>
+              <a:rPr lang="en-US" dirty="0"/>
+              <a:t>Timeline of </a:t>
+            </a:r>
+            <a:r>
+              <a:rPr lang="en-US" dirty="0" err="1"/>
+              <a:t>scRNA</a:t>
+            </a:r>
+            <a:r>
+              <a:rPr lang="en-US" dirty="0"/>
+              <a:t>-Seq Technologies</a:t>
+            </a:r>
+          </a:p>
+        </p:txBody>
+      </p:sp>
+    </p:spTree>
+  </p:cSld>
+  <p:clrMapOvr>
+    <a:masterClrMapping/>
+  </p:clrMapOvr>
+</p:sld>
+</file>
+
+<file path=ppt/slides/slide8.xml><?xml version="1.0" encoding="utf-8"?>
+<p:sld xmlns:a="http://schemas.openxmlformats.org/drawingml/2006/main" xmlns:r="http://schemas.openxmlformats.org/officeDocument/2006/relationships" xmlns:p="http://schemas.openxmlformats.org/presentationml/2006/main">
+  <p:cSld>
+    <p:spTree>
+      <p:nvGrpSpPr>
+        <p:cNvPr id="1" name="Shape 105"/>
+        <p:cNvGrpSpPr/>
+        <p:nvPr/>
+      </p:nvGrpSpPr>
+      <p:grpSpPr>
+        <a:xfrm>
+          <a:off x="0" y="0"/>
+          <a:ext cx="0" cy="0"/>
+          <a:chOff x="0" y="0"/>
+          <a:chExt cx="0" cy="0"/>
+        </a:xfrm>
+      </p:grpSpPr>
+      <p:pic>
+        <p:nvPicPr>
+          <p:cNvPr id="106" name="Google Shape;106;p23"/>
+          <p:cNvPicPr preferRelativeResize="0"/>
+          <p:nvPr/>
+        </p:nvPicPr>
+        <p:blipFill>
+          <a:blip r:embed="rId3">
+            <a:alphaModFix/>
+          </a:blip>
+          <a:stretch>
+            <a:fillRect/>
+          </a:stretch>
+        </p:blipFill>
+        <p:spPr>
+          <a:xfrm>
+            <a:off x="274933" y="977521"/>
+            <a:ext cx="11785600" cy="4902957"/>
+          </a:xfrm>
+          <a:prstGeom prst="rect">
+            <a:avLst/>
+          </a:prstGeom>
+          <a:noFill/>
+          <a:ln>
+            <a:noFill/>
+          </a:ln>
+        </p:spPr>
+      </p:pic>
+      <p:sp>
+        <p:nvSpPr>
+          <p:cNvPr id="2" name="TextBox 1">
+            <a:extLst>
+              <a:ext uri="{FF2B5EF4-FFF2-40B4-BE49-F238E27FC236}">
+                <a16:creationId xmlns:a16="http://schemas.microsoft.com/office/drawing/2014/main" id="{70ACC4D4-D1B5-BDFB-E637-3EC9B1ECE709}"/>
+              </a:ext>
+            </a:extLst>
+          </p:cNvPr>
+          <p:cNvSpPr txBox="1"/>
+          <p:nvPr/>
+        </p:nvSpPr>
+        <p:spPr>
+          <a:xfrm>
+            <a:off x="0" y="6627168"/>
+            <a:ext cx="2692400" cy="230832"/>
+          </a:xfrm>
+          <a:prstGeom prst="rect">
+            <a:avLst/>
+          </a:prstGeom>
+          <a:noFill/>
+        </p:spPr>
+        <p:txBody>
+          <a:bodyPr wrap="square">
+            <a:spAutoFit/>
+          </a:bodyPr>
+          <a:lstStyle/>
+          <a:p>
+            <a:r>
+              <a:rPr lang="en-US" sz="900" b="0" i="1" dirty="0">
+                <a:solidFill>
+                  <a:srgbClr val="212121"/>
+                </a:solidFill>
+                <a:effectLst/>
+                <a:latin typeface="Helvetica Neue" panose="02000503000000020004" pitchFamily="2" charset="0"/>
+              </a:rPr>
+              <a:t>Liu, 2016; 5: F1000 Faculty Rev-182.</a:t>
+            </a:r>
+            <a:endParaRPr lang="en-US" sz="900" i="1" dirty="0"/>
+          </a:p>
+        </p:txBody>
+      </p:sp>
+      <p:sp>
+        <p:nvSpPr>
+          <p:cNvPr id="3" name="Title 2">
+            <a:extLst>
+              <a:ext uri="{FF2B5EF4-FFF2-40B4-BE49-F238E27FC236}">
+                <a16:creationId xmlns:a16="http://schemas.microsoft.com/office/drawing/2014/main" id="{620FD491-3822-F3DC-EAAA-F46570D7C802}"/>
+              </a:ext>
+            </a:extLst>
+          </p:cNvPr>
+          <p:cNvSpPr>
+            <a:spLocks noGrp="1"/>
+          </p:cNvSpPr>
+          <p:nvPr>
+            <p:ph type="title"/>
+          </p:nvPr>
+        </p:nvSpPr>
+        <p:spPr/>
+        <p:txBody>
+          <a:bodyPr>
+            <a:normAutofit/>
+          </a:bodyPr>
+          <a:lstStyle/>
+          <a:p>
+            <a:r>
+              <a:rPr lang="en-US" dirty="0"/>
+              <a:t>Continuous Development of Larger Atlas Datasets </a:t>
+            </a:r>
+          </a:p>
+        </p:txBody>
+      </p:sp>
+    </p:spTree>
+  </p:cSld>
+  <p:clrMapOvr>
+    <a:masterClrMapping/>
+  </p:clrMapOvr>
+</p:sld>
+</file>
+
+<file path=ppt/slides/slide9.xml><?xml version="1.0" encoding="utf-8"?>
+<p:sld xmlns:a="http://schemas.openxmlformats.org/drawingml/2006/main" xmlns:r="http://schemas.openxmlformats.org/officeDocument/2006/relationships" xmlns:p="http://schemas.openxmlformats.org/presentationml/2006/main">
+  <p:cSld>
+    <p:spTree>
+      <p:nvGrpSpPr>
+        <p:cNvPr id="1" name="Shape 85"/>
+        <p:cNvGrpSpPr/>
+        <p:nvPr/>
+      </p:nvGrpSpPr>
+      <p:grpSpPr>
+        <a:xfrm>
+          <a:off x="0" y="0"/>
+          <a:ext cx="0" cy="0"/>
+          <a:chOff x="0" y="0"/>
+          <a:chExt cx="0" cy="0"/>
+        </a:xfrm>
+      </p:grpSpPr>
+      <p:pic>
+        <p:nvPicPr>
+          <p:cNvPr id="86" name="Google Shape;86;p19"/>
+          <p:cNvPicPr preferRelativeResize="0">
+            <a:picLocks noChangeAspect="1"/>
+          </p:cNvPicPr>
+          <p:nvPr/>
+        </p:nvPicPr>
+        <p:blipFill rotWithShape="1">
+          <a:blip r:embed="rId3">
+            <a:alphaModFix/>
+          </a:blip>
+          <a:srcRect t="4981"/>
+          <a:stretch/>
+        </p:blipFill>
+        <p:spPr>
+          <a:xfrm>
+            <a:off x="111760" y="629173"/>
+            <a:ext cx="11594139" cy="5918573"/>
+          </a:xfrm>
+          <a:prstGeom prst="rect">
+            <a:avLst/>
+          </a:prstGeom>
+          <a:noFill/>
+          <a:ln>
+            <a:noFill/>
+          </a:ln>
+        </p:spPr>
+      </p:pic>
+      <p:sp>
+        <p:nvSpPr>
+          <p:cNvPr id="2" name="Title 1">
+            <a:extLst>
+              <a:ext uri="{FF2B5EF4-FFF2-40B4-BE49-F238E27FC236}">
+                <a16:creationId xmlns:a16="http://schemas.microsoft.com/office/drawing/2014/main" id="{E9806AD1-0028-D40F-7A84-7AABD9C775B2}"/>
+              </a:ext>
+            </a:extLst>
+          </p:cNvPr>
+          <p:cNvSpPr>
+            <a:spLocks noGrp="1"/>
+          </p:cNvSpPr>
+          <p:nvPr>
+            <p:ph type="title"/>
+          </p:nvPr>
+        </p:nvSpPr>
+        <p:spPr/>
+        <p:txBody>
+          <a:bodyPr/>
+          <a:lstStyle/>
+          <a:p>
+            <a:r>
+              <a:rPr lang="en-US" dirty="0"/>
+              <a:t>Basic single cell RNA-Seq Workflow</a:t>
+            </a:r>
+          </a:p>
+        </p:txBody>
+      </p:sp>
+      <p:sp>
+        <p:nvSpPr>
+          <p:cNvPr id="3" name="TextBox 2">
+            <a:extLst>
+              <a:ext uri="{FF2B5EF4-FFF2-40B4-BE49-F238E27FC236}">
+                <a16:creationId xmlns:a16="http://schemas.microsoft.com/office/drawing/2014/main" id="{592AEBD2-BDDF-40FC-3701-72B04C98E21F}"/>
+              </a:ext>
+            </a:extLst>
+          </p:cNvPr>
+          <p:cNvSpPr txBox="1"/>
+          <p:nvPr/>
+        </p:nvSpPr>
+        <p:spPr>
+          <a:xfrm>
+            <a:off x="0" y="6581676"/>
+            <a:ext cx="2692400" cy="230832"/>
+          </a:xfrm>
+          <a:prstGeom prst="rect">
+            <a:avLst/>
+          </a:prstGeom>
+          <a:noFill/>
+        </p:spPr>
+        <p:txBody>
+          <a:bodyPr wrap="square">
+            <a:spAutoFit/>
+          </a:bodyPr>
+          <a:lstStyle/>
+          <a:p>
+            <a:r>
+              <a:rPr lang="en-US" sz="900" b="0" i="1" dirty="0">
+                <a:solidFill>
+                  <a:srgbClr val="212121"/>
+                </a:solidFill>
+                <a:effectLst/>
+                <a:latin typeface="Helvetica Neue" panose="02000503000000020004" pitchFamily="2" charset="0"/>
+              </a:rPr>
+              <a:t>Liu, 2016; 5: F1000 Faculty Rev-182.</a:t>
+            </a:r>
+            <a:endParaRPr lang="en-US" sz="900" i="1" dirty="0"/>
+          </a:p>
+        </p:txBody>
+      </p:sp>
+    </p:spTree>
   </p:cSld>
   <p:clrMapOvr>
     <a:masterClrMapping/>

</xml_diff>